<commit_message>
update commit on presentations
</commit_message>
<xml_diff>
--- a/mid-season_report/AGE.pptx
+++ b/mid-season_report/AGE.pptx
@@ -5,7 +5,7 @@
     <p:sldMasterId id="2147483648" r:id="rId1"/>
   </p:sldMasterIdLst>
   <p:notesMasterIdLst>
-    <p:notesMasterId r:id="rId24"/>
+    <p:notesMasterId r:id="rId29"/>
   </p:notesMasterIdLst>
   <p:sldIdLst>
     <p:sldId id="256" r:id="rId2"/>
@@ -30,6 +30,11 @@
     <p:sldId id="275" r:id="rId21"/>
     <p:sldId id="276" r:id="rId22"/>
     <p:sldId id="277" r:id="rId23"/>
+    <p:sldId id="278" r:id="rId24"/>
+    <p:sldId id="279" r:id="rId25"/>
+    <p:sldId id="280" r:id="rId26"/>
+    <p:sldId id="282" r:id="rId27"/>
+    <p:sldId id="281" r:id="rId28"/>
   </p:sldIdLst>
   <p:sldSz cx="12192000" cy="6858000"/>
   <p:notesSz cx="6858000" cy="9144000"/>
@@ -3343,7 +3348,7 @@
           <a:p>
             <a:fld id="{3316645B-68E7-4A75-B8BC-B6466C3FC8B3}" type="datetimeFigureOut">
               <a:rPr lang="en-GB"/>
-              <a:t>12/04/2018</a:t>
+              <a:t>13/04/2018</a:t>
             </a:fld>
             <a:endParaRPr lang="en-GB"/>
           </a:p>
@@ -3839,7 +3844,7 @@
           <a:p>
             <a:fld id="{5264C8E3-3C8E-4826-9D8E-1AE651C0EA99}" type="slidenum">
               <a:rPr lang="en-GB"/>
-              <a:t>‹#›</a:t>
+              <a:t>2</a:t>
             </a:fld>
             <a:endParaRPr lang="en-GB"/>
           </a:p>
@@ -4078,7 +4083,7 @@
           <a:p>
             <a:fld id="{5264C8E3-3C8E-4826-9D8E-1AE651C0EA99}" type="slidenum">
               <a:rPr lang="en-GB"/>
-              <a:t>‹#›</a:t>
+              <a:t>11</a:t>
             </a:fld>
             <a:endParaRPr lang="en-GB"/>
           </a:p>
@@ -4451,7 +4456,7 @@
           <a:p>
             <a:fld id="{5264C8E3-3C8E-4826-9D8E-1AE651C0EA99}" type="slidenum">
               <a:rPr lang="en-GB"/>
-              <a:t>‹#›</a:t>
+              <a:t>12</a:t>
             </a:fld>
             <a:endParaRPr lang="en-GB"/>
           </a:p>
@@ -5500,7 +5505,7 @@
           <a:p>
             <a:fld id="{5264C8E3-3C8E-4826-9D8E-1AE651C0EA99}" type="slidenum">
               <a:rPr lang="en-GB"/>
-              <a:t>‹#›</a:t>
+              <a:t>13</a:t>
             </a:fld>
             <a:endParaRPr lang="en-GB"/>
           </a:p>
@@ -5715,7 +5720,7 @@
           <a:p>
             <a:fld id="{5264C8E3-3C8E-4826-9D8E-1AE651C0EA99}" type="slidenum">
               <a:rPr lang="en-GB"/>
-              <a:t>‹#›</a:t>
+              <a:t>14</a:t>
             </a:fld>
             <a:endParaRPr lang="en-GB"/>
           </a:p>
@@ -6254,7 +6259,7 @@
           <a:p>
             <a:fld id="{5264C8E3-3C8E-4826-9D8E-1AE651C0EA99}" type="slidenum">
               <a:rPr lang="en-GB"/>
-              <a:t>‹#›</a:t>
+              <a:t>15</a:t>
             </a:fld>
             <a:endParaRPr lang="en-GB"/>
           </a:p>
@@ -6759,7 +6764,7 @@
           <a:p>
             <a:fld id="{5264C8E3-3C8E-4826-9D8E-1AE651C0EA99}" type="slidenum">
               <a:rPr lang="en-GB"/>
-              <a:t>‹#›</a:t>
+              <a:t>16</a:t>
             </a:fld>
             <a:endParaRPr lang="en-GB"/>
           </a:p>
@@ -6848,7 +6853,7 @@
           <a:p>
             <a:fld id="{5264C8E3-3C8E-4826-9D8E-1AE651C0EA99}" type="slidenum">
               <a:rPr lang="en-GB"/>
-              <a:t>‹#›</a:t>
+              <a:t>17</a:t>
             </a:fld>
             <a:endParaRPr lang="en-GB"/>
           </a:p>
@@ -7391,7 +7396,7 @@
           <a:p>
             <a:fld id="{5264C8E3-3C8E-4826-9D8E-1AE651C0EA99}" type="slidenum">
               <a:rPr lang="en-GB"/>
-              <a:t>‹#›</a:t>
+              <a:t>18</a:t>
             </a:fld>
             <a:endParaRPr lang="en-GB"/>
           </a:p>
@@ -7720,7 +7725,7 @@
           <a:p>
             <a:fld id="{5264C8E3-3C8E-4826-9D8E-1AE651C0EA99}" type="slidenum">
               <a:rPr lang="en-GB"/>
-              <a:t>‹#›</a:t>
+              <a:t>19</a:t>
             </a:fld>
             <a:endParaRPr lang="en-GB"/>
           </a:p>
@@ -7815,7 +7820,7 @@
           <a:p>
             <a:fld id="{5264C8E3-3C8E-4826-9D8E-1AE651C0EA99}" type="slidenum">
               <a:rPr lang="en-GB"/>
-              <a:t>‹#›</a:t>
+              <a:t>20</a:t>
             </a:fld>
             <a:endParaRPr lang="en-GB"/>
           </a:p>
@@ -7982,7 +7987,7 @@
           <a:p>
             <a:fld id="{5264C8E3-3C8E-4826-9D8E-1AE651C0EA99}" type="slidenum">
               <a:rPr lang="en-GB"/>
-              <a:t>‹#›</a:t>
+              <a:t>3</a:t>
             </a:fld>
             <a:endParaRPr lang="en-GB"/>
           </a:p>
@@ -8253,7 +8258,7 @@
               <a:rPr lang="en-US" dirty="0">
                 <a:cs typeface="Calibri"/>
               </a:rPr>
-              <a:t> accuracy de … e </a:t>
+              <a:t> accuracy de 95.9% e </a:t>
             </a:r>
             <a:r>
               <a:rPr lang="en-US" dirty="0" err="1">
@@ -8277,7 +8282,7 @@
               <a:rPr lang="en-US" dirty="0">
                 <a:cs typeface="Calibri"/>
               </a:rPr>
-              <a:t> da </a:t>
+              <a:t> da macro </a:t>
             </a:r>
             <a:r>
               <a:rPr lang="en-US" dirty="0" err="1">
@@ -8289,7 +8294,115 @@
               <a:rPr lang="en-US" dirty="0">
                 <a:cs typeface="Calibri"/>
               </a:rPr>
-              <a:t> ROC de ...</a:t>
+              <a:t> ROC de 0.998. Pode-se ver no </a:t>
+            </a:r>
+            <a:r>
+              <a:rPr lang="en-US" dirty="0" err="1">
+                <a:cs typeface="Calibri"/>
+              </a:rPr>
+              <a:t>relatório</a:t>
+            </a:r>
+            <a:r>
+              <a:rPr lang="en-US" dirty="0">
+                <a:cs typeface="Calibri"/>
+              </a:rPr>
+              <a:t> de </a:t>
+            </a:r>
+            <a:r>
+              <a:rPr lang="en-US" dirty="0" err="1">
+                <a:cs typeface="Calibri"/>
+              </a:rPr>
+              <a:t>classificação</a:t>
+            </a:r>
+            <a:r>
+              <a:rPr lang="en-US" dirty="0">
+                <a:cs typeface="Calibri"/>
+              </a:rPr>
+              <a:t> que a </a:t>
+            </a:r>
+            <a:r>
+              <a:rPr lang="en-US" dirty="0" err="1">
+                <a:cs typeface="Calibri"/>
+              </a:rPr>
+              <a:t>grande</a:t>
+            </a:r>
+            <a:r>
+              <a:rPr lang="en-US" dirty="0">
+                <a:cs typeface="Calibri"/>
+              </a:rPr>
+              <a:t> </a:t>
+            </a:r>
+            <a:r>
+              <a:rPr lang="en-US" dirty="0" err="1">
+                <a:cs typeface="Calibri"/>
+              </a:rPr>
+              <a:t>parte</a:t>
+            </a:r>
+            <a:r>
+              <a:rPr lang="en-US" dirty="0">
+                <a:cs typeface="Calibri"/>
+              </a:rPr>
+              <a:t> dos </a:t>
+            </a:r>
+            <a:r>
+              <a:rPr lang="en-US" dirty="0" err="1">
+                <a:cs typeface="Calibri"/>
+              </a:rPr>
+              <a:t>utilizadores</a:t>
+            </a:r>
+            <a:r>
+              <a:rPr lang="en-US" dirty="0">
+                <a:cs typeface="Calibri"/>
+              </a:rPr>
+              <a:t> são corretamente identificados, com </a:t>
+            </a:r>
+            <a:r>
+              <a:rPr lang="en-US" dirty="0" err="1">
+                <a:cs typeface="Calibri"/>
+              </a:rPr>
+              <a:t>bons</a:t>
+            </a:r>
+            <a:r>
+              <a:rPr lang="en-US" dirty="0">
+                <a:cs typeface="Calibri"/>
+              </a:rPr>
+              <a:t> </a:t>
+            </a:r>
+            <a:r>
+              <a:rPr lang="en-US" dirty="0" err="1">
+                <a:cs typeface="Calibri"/>
+              </a:rPr>
+              <a:t>valores</a:t>
+            </a:r>
+            <a:r>
+              <a:rPr lang="en-US" dirty="0">
+                <a:cs typeface="Calibri"/>
+              </a:rPr>
+              <a:t> de </a:t>
+            </a:r>
+            <a:r>
+              <a:rPr lang="en-US" dirty="0" err="1">
+                <a:cs typeface="Calibri"/>
+              </a:rPr>
+              <a:t>precisão</a:t>
+            </a:r>
+            <a:r>
+              <a:rPr lang="en-US" dirty="0">
+                <a:cs typeface="Calibri"/>
+              </a:rPr>
+              <a:t> e </a:t>
+            </a:r>
+            <a:r>
+              <a:rPr lang="en-US" dirty="0" err="1">
+                <a:cs typeface="Calibri"/>
+              </a:rPr>
+              <a:t>sensibilidade</a:t>
+            </a:r>
+            <a:r>
+              <a:rPr lang="en-US" dirty="0">
+                <a:cs typeface="Calibri"/>
+              </a:rPr>
+              <a:t>.</a:t>
             </a:r>
           </a:p>
         </p:txBody>
@@ -8311,7 +8424,7 @@
           <a:p>
             <a:fld id="{5264C8E3-3C8E-4826-9D8E-1AE651C0EA99}" type="slidenum">
               <a:rPr lang="en-GB"/>
-              <a:t>‹#›</a:t>
+              <a:t>21</a:t>
             </a:fld>
             <a:endParaRPr lang="en-GB"/>
           </a:p>
@@ -8761,11 +8874,6 @@
               <a:t> para 1.</a:t>
             </a:r>
           </a:p>
-          <a:p>
-            <a:endParaRPr lang="en-GB" dirty="0">
-              <a:cs typeface="Calibri"/>
-            </a:endParaRPr>
-          </a:p>
         </p:txBody>
       </p:sp>
       <p:sp>
@@ -8785,7 +8893,7 @@
           <a:p>
             <a:fld id="{5264C8E3-3C8E-4826-9D8E-1AE651C0EA99}" type="slidenum">
               <a:rPr lang="en-GB"/>
-              <a:t>‹#›</a:t>
+              <a:t>22</a:t>
             </a:fld>
             <a:endParaRPr lang="en-GB"/>
           </a:p>
@@ -8795,6 +8903,1288 @@
     <p:extLst>
       <p:ext uri="{BB962C8B-B14F-4D97-AF65-F5344CB8AC3E}">
         <p14:creationId xmlns:p14="http://schemas.microsoft.com/office/powerpoint/2010/main" val="2598924517"/>
+      </p:ext>
+    </p:extLst>
+  </p:cSld>
+  <p:clrMapOvr>
+    <a:masterClrMapping/>
+  </p:clrMapOvr>
+</p:notes>
+</file>
+
+<file path=ppt/notesSlides/notesSlide22.xml><?xml version="1.0" encoding="utf-8"?>
+<p:notes xmlns:a="http://schemas.openxmlformats.org/drawingml/2006/main" xmlns:r="http://schemas.openxmlformats.org/officeDocument/2006/relationships" xmlns:p="http://schemas.openxmlformats.org/presentationml/2006/main">
+  <p:cSld>
+    <p:spTree>
+      <p:nvGrpSpPr>
+        <p:cNvPr id="1" name=""/>
+        <p:cNvGrpSpPr/>
+        <p:nvPr/>
+      </p:nvGrpSpPr>
+      <p:grpSpPr>
+        <a:xfrm>
+          <a:off x="0" y="0"/>
+          <a:ext cx="0" cy="0"/>
+          <a:chOff x="0" y="0"/>
+          <a:chExt cx="0" cy="0"/>
+        </a:xfrm>
+      </p:grpSpPr>
+      <p:sp>
+        <p:nvSpPr>
+          <p:cNvPr id="2" name="Slide Image Placeholder 1"/>
+          <p:cNvSpPr>
+            <a:spLocks noGrp="1" noRot="1" noChangeAspect="1"/>
+          </p:cNvSpPr>
+          <p:nvPr>
+            <p:ph type="sldImg"/>
+          </p:nvPr>
+        </p:nvSpPr>
+        <p:spPr/>
+      </p:sp>
+      <p:sp>
+        <p:nvSpPr>
+          <p:cNvPr id="3" name="Notes Placeholder 2"/>
+          <p:cNvSpPr>
+            <a:spLocks noGrp="1"/>
+          </p:cNvSpPr>
+          <p:nvPr>
+            <p:ph type="body" idx="1"/>
+          </p:nvPr>
+        </p:nvSpPr>
+        <p:spPr/>
+        <p:txBody>
+          <a:bodyPr/>
+          <a:lstStyle/>
+          <a:p>
+            <a:r>
+              <a:rPr lang="en-GB" dirty="0"/>
+              <a:t>No final </a:t>
+            </a:r>
+            <a:r>
+              <a:rPr lang="en-GB" dirty="0" err="1"/>
+              <a:t>obtém</a:t>
+            </a:r>
+            <a:r>
+              <a:rPr lang="en-GB" dirty="0"/>
+              <a:t>-se </a:t>
+            </a:r>
+            <a:r>
+              <a:rPr lang="en-GB" dirty="0" err="1"/>
+              <a:t>uma</a:t>
+            </a:r>
+            <a:r>
+              <a:rPr lang="en-GB" dirty="0"/>
+              <a:t> </a:t>
+            </a:r>
+            <a:r>
+              <a:rPr lang="en-GB" dirty="0" err="1"/>
+              <a:t>probabilidade</a:t>
+            </a:r>
+            <a:r>
+              <a:rPr lang="en-GB" dirty="0"/>
+              <a:t> </a:t>
+            </a:r>
+            <a:r>
+              <a:rPr lang="en-GB" dirty="0" err="1"/>
+              <a:t>extremamente</a:t>
+            </a:r>
+            <a:r>
+              <a:rPr lang="en-GB" dirty="0"/>
+              <a:t> </a:t>
+            </a:r>
+            <a:r>
+              <a:rPr lang="en-GB" dirty="0" err="1"/>
+              <a:t>próxima</a:t>
+            </a:r>
+            <a:r>
+              <a:rPr lang="en-GB" dirty="0"/>
+              <a:t> de 1 para </a:t>
+            </a:r>
+            <a:r>
+              <a:rPr lang="en-GB" dirty="0" err="1"/>
+              <a:t>todas</a:t>
+            </a:r>
+            <a:r>
+              <a:rPr lang="en-GB" dirty="0"/>
+              <a:t> as </a:t>
+            </a:r>
+            <a:r>
+              <a:rPr lang="en-GB" dirty="0" err="1"/>
+              <a:t>sessões</a:t>
+            </a:r>
+            <a:r>
+              <a:rPr lang="en-GB" dirty="0"/>
+              <a:t> para o </a:t>
+            </a:r>
+            <a:r>
+              <a:rPr lang="en-GB" dirty="0" err="1"/>
+              <a:t>utilizador</a:t>
+            </a:r>
+            <a:r>
+              <a:rPr lang="en-GB" dirty="0"/>
+              <a:t> 18, </a:t>
+            </a:r>
+            <a:r>
+              <a:rPr lang="en-GB" dirty="0" err="1"/>
+              <a:t>tendo</a:t>
+            </a:r>
+            <a:r>
+              <a:rPr lang="en-GB" dirty="0"/>
+              <a:t>-se </a:t>
+            </a:r>
+            <a:r>
+              <a:rPr lang="en-GB" dirty="0" err="1"/>
+              <a:t>então</a:t>
+            </a:r>
+            <a:r>
+              <a:rPr lang="en-GB" dirty="0"/>
+              <a:t> </a:t>
+            </a:r>
+            <a:r>
+              <a:rPr lang="en-GB" dirty="0" err="1"/>
+              <a:t>identificado</a:t>
+            </a:r>
+            <a:r>
+              <a:rPr lang="en-GB" dirty="0"/>
+              <a:t> </a:t>
+            </a:r>
+            <a:r>
+              <a:rPr lang="en-GB" dirty="0" err="1"/>
+              <a:t>uma</a:t>
+            </a:r>
+            <a:r>
+              <a:rPr lang="en-GB" dirty="0"/>
+              <a:t> </a:t>
+            </a:r>
+            <a:r>
+              <a:rPr lang="en-GB" dirty="0" err="1"/>
+              <a:t>pessoa</a:t>
+            </a:r>
+            <a:r>
+              <a:rPr lang="en-GB" dirty="0"/>
+              <a:t> </a:t>
+            </a:r>
+            <a:r>
+              <a:rPr lang="en-GB" dirty="0" err="1"/>
+              <a:t>através</a:t>
+            </a:r>
+            <a:r>
+              <a:rPr lang="en-GB" dirty="0"/>
+              <a:t> dos dados </a:t>
+            </a:r>
+            <a:r>
+              <a:rPr lang="en-GB" dirty="0" err="1"/>
+              <a:t>recolhidos</a:t>
+            </a:r>
+            <a:r>
+              <a:rPr lang="en-GB" dirty="0"/>
+              <a:t> </a:t>
+            </a:r>
+            <a:r>
+              <a:rPr lang="en-GB" dirty="0" err="1"/>
+              <a:t>por</a:t>
+            </a:r>
+            <a:r>
+              <a:rPr lang="en-GB" dirty="0"/>
+              <a:t> um smartphone.</a:t>
+            </a:r>
+          </a:p>
+        </p:txBody>
+      </p:sp>
+      <p:sp>
+        <p:nvSpPr>
+          <p:cNvPr id="4" name="Slide Number Placeholder 3"/>
+          <p:cNvSpPr>
+            <a:spLocks noGrp="1"/>
+          </p:cNvSpPr>
+          <p:nvPr>
+            <p:ph type="sldNum" sz="quarter" idx="10"/>
+          </p:nvPr>
+        </p:nvSpPr>
+        <p:spPr/>
+        <p:txBody>
+          <a:bodyPr/>
+          <a:lstStyle/>
+          <a:p>
+            <a:fld id="{5264C8E3-3C8E-4826-9D8E-1AE651C0EA99}" type="slidenum">
+              <a:rPr lang="en-GB"/>
+              <a:t>23</a:t>
+            </a:fld>
+            <a:endParaRPr lang="en-GB"/>
+          </a:p>
+        </p:txBody>
+      </p:sp>
+    </p:spTree>
+    <p:extLst>
+      <p:ext uri="{BB962C8B-B14F-4D97-AF65-F5344CB8AC3E}">
+        <p14:creationId xmlns:p14="http://schemas.microsoft.com/office/powerpoint/2010/main" val="215180734"/>
+      </p:ext>
+    </p:extLst>
+  </p:cSld>
+  <p:clrMapOvr>
+    <a:masterClrMapping/>
+  </p:clrMapOvr>
+</p:notes>
+</file>
+
+<file path=ppt/notesSlides/notesSlide23.xml><?xml version="1.0" encoding="utf-8"?>
+<p:notes xmlns:a="http://schemas.openxmlformats.org/drawingml/2006/main" xmlns:r="http://schemas.openxmlformats.org/officeDocument/2006/relationships" xmlns:p="http://schemas.openxmlformats.org/presentationml/2006/main">
+  <p:cSld>
+    <p:spTree>
+      <p:nvGrpSpPr>
+        <p:cNvPr id="1" name=""/>
+        <p:cNvGrpSpPr/>
+        <p:nvPr/>
+      </p:nvGrpSpPr>
+      <p:grpSpPr>
+        <a:xfrm>
+          <a:off x="0" y="0"/>
+          <a:ext cx="0" cy="0"/>
+          <a:chOff x="0" y="0"/>
+          <a:chExt cx="0" cy="0"/>
+        </a:xfrm>
+      </p:grpSpPr>
+      <p:sp>
+        <p:nvSpPr>
+          <p:cNvPr id="2" name="Slide Image Placeholder 1"/>
+          <p:cNvSpPr>
+            <a:spLocks noGrp="1" noRot="1" noChangeAspect="1"/>
+          </p:cNvSpPr>
+          <p:nvPr>
+            <p:ph type="sldImg"/>
+          </p:nvPr>
+        </p:nvSpPr>
+        <p:spPr/>
+      </p:sp>
+      <p:sp>
+        <p:nvSpPr>
+          <p:cNvPr id="3" name="Notes Placeholder 2"/>
+          <p:cNvSpPr>
+            <a:spLocks noGrp="1"/>
+          </p:cNvSpPr>
+          <p:nvPr>
+            <p:ph type="body" idx="1"/>
+          </p:nvPr>
+        </p:nvSpPr>
+        <p:spPr/>
+        <p:txBody>
+          <a:bodyPr/>
+          <a:lstStyle/>
+          <a:p>
+            <a:r>
+              <a:rPr lang="en-US" dirty="0">
+                <a:cs typeface="Calibri"/>
+              </a:rPr>
+              <a:t>O </a:t>
+            </a:r>
+            <a:r>
+              <a:rPr lang="en-US" dirty="0" err="1">
+                <a:cs typeface="Calibri"/>
+              </a:rPr>
+              <a:t>passo</a:t>
+            </a:r>
+            <a:r>
+              <a:rPr lang="en-US" dirty="0">
+                <a:cs typeface="Calibri"/>
+              </a:rPr>
+              <a:t> de </a:t>
+            </a:r>
+            <a:r>
+              <a:rPr lang="en-US" dirty="0" err="1">
+                <a:cs typeface="Calibri"/>
+              </a:rPr>
+              <a:t>seleção</a:t>
+            </a:r>
+            <a:r>
+              <a:rPr lang="en-US" dirty="0">
+                <a:cs typeface="Calibri"/>
+              </a:rPr>
+              <a:t> de features </a:t>
+            </a:r>
+            <a:r>
+              <a:rPr lang="en-US" dirty="0" err="1">
+                <a:cs typeface="Calibri"/>
+              </a:rPr>
+              <a:t>foi</a:t>
+            </a:r>
+            <a:r>
+              <a:rPr lang="en-US" dirty="0">
+                <a:cs typeface="Calibri"/>
+              </a:rPr>
+              <a:t> </a:t>
+            </a:r>
+            <a:r>
+              <a:rPr lang="en-US" dirty="0" err="1">
+                <a:cs typeface="Calibri"/>
+              </a:rPr>
+              <a:t>muito</a:t>
+            </a:r>
+            <a:r>
+              <a:rPr lang="en-US" dirty="0">
+                <a:cs typeface="Calibri"/>
+              </a:rPr>
+              <a:t> </a:t>
+            </a:r>
+            <a:r>
+              <a:rPr lang="en-US" dirty="0" err="1">
+                <a:cs typeface="Calibri"/>
+              </a:rPr>
+              <a:t>importante</a:t>
+            </a:r>
+            <a:r>
+              <a:rPr lang="en-US" dirty="0">
+                <a:cs typeface="Calibri"/>
+              </a:rPr>
+              <a:t> e </a:t>
+            </a:r>
+            <a:r>
+              <a:rPr lang="en-US" dirty="0" err="1">
+                <a:cs typeface="Calibri"/>
+              </a:rPr>
+              <a:t>elucidativo</a:t>
+            </a:r>
+            <a:r>
+              <a:rPr lang="en-US" dirty="0">
+                <a:cs typeface="Calibri"/>
+              </a:rPr>
+              <a:t> da </a:t>
+            </a:r>
+            <a:r>
+              <a:rPr lang="en-US" dirty="0" err="1">
+                <a:cs typeface="Calibri"/>
+              </a:rPr>
+              <a:t>importância</a:t>
+            </a:r>
+            <a:r>
+              <a:rPr lang="en-US" dirty="0">
+                <a:cs typeface="Calibri"/>
+              </a:rPr>
+              <a:t> das features </a:t>
+            </a:r>
+            <a:r>
+              <a:rPr lang="en-US" dirty="0" err="1">
+                <a:cs typeface="Calibri"/>
+              </a:rPr>
+              <a:t>recolhidas</a:t>
+            </a:r>
+            <a:r>
+              <a:rPr lang="en-US" dirty="0">
+                <a:cs typeface="Calibri"/>
+              </a:rPr>
+              <a:t>: de facto, </a:t>
+            </a:r>
+            <a:r>
+              <a:rPr lang="en-US" dirty="0" err="1">
+                <a:cs typeface="Calibri"/>
+              </a:rPr>
+              <a:t>observa</a:t>
+            </a:r>
+            <a:r>
+              <a:rPr lang="en-US" dirty="0">
+                <a:cs typeface="Calibri"/>
+              </a:rPr>
+              <a:t>-se que as features </a:t>
+            </a:r>
+            <a:r>
+              <a:rPr lang="en-US" dirty="0" err="1">
+                <a:cs typeface="Calibri"/>
+              </a:rPr>
+              <a:t>retiradas</a:t>
+            </a:r>
+            <a:r>
+              <a:rPr lang="en-US" dirty="0">
+                <a:cs typeface="Calibri"/>
+              </a:rPr>
+              <a:t> do </a:t>
+            </a:r>
+            <a:r>
+              <a:rPr lang="en-US" dirty="0" err="1">
+                <a:cs typeface="Calibri"/>
+              </a:rPr>
+              <a:t>acelerómetro</a:t>
+            </a:r>
+            <a:r>
+              <a:rPr lang="en-US" dirty="0">
+                <a:cs typeface="Calibri"/>
+              </a:rPr>
+              <a:t> </a:t>
+            </a:r>
+            <a:r>
+              <a:rPr lang="en-US" dirty="0" err="1">
+                <a:cs typeface="Calibri"/>
+              </a:rPr>
+              <a:t>possuem</a:t>
+            </a:r>
+            <a:r>
+              <a:rPr lang="en-US" dirty="0">
+                <a:cs typeface="Calibri"/>
+              </a:rPr>
+              <a:t> </a:t>
+            </a:r>
+            <a:r>
+              <a:rPr lang="en-US" dirty="0" err="1">
+                <a:cs typeface="Calibri"/>
+              </a:rPr>
+              <a:t>mais</a:t>
+            </a:r>
+            <a:r>
+              <a:rPr lang="en-US" dirty="0">
+                <a:cs typeface="Calibri"/>
+              </a:rPr>
+              <a:t> </a:t>
+            </a:r>
+            <a:r>
+              <a:rPr lang="en-US" dirty="0" err="1">
+                <a:cs typeface="Calibri"/>
+              </a:rPr>
+              <a:t>utilidade</a:t>
+            </a:r>
+            <a:r>
+              <a:rPr lang="en-US" dirty="0">
+                <a:cs typeface="Calibri"/>
+              </a:rPr>
+              <a:t> que as de </a:t>
+            </a:r>
+            <a:r>
+              <a:rPr lang="en-US" dirty="0" err="1">
+                <a:cs typeface="Calibri"/>
+              </a:rPr>
+              <a:t>giroscópio</a:t>
+            </a:r>
+            <a:r>
+              <a:rPr lang="en-US" dirty="0">
+                <a:cs typeface="Calibri"/>
+              </a:rPr>
+              <a:t>, </a:t>
+            </a:r>
+            <a:r>
+              <a:rPr lang="en-US" dirty="0" err="1">
+                <a:cs typeface="Calibri"/>
+              </a:rPr>
+              <a:t>bem</a:t>
+            </a:r>
+            <a:r>
+              <a:rPr lang="en-US" dirty="0">
+                <a:cs typeface="Calibri"/>
+              </a:rPr>
+              <a:t> </a:t>
+            </a:r>
+            <a:r>
+              <a:rPr lang="en-US" dirty="0" err="1">
+                <a:cs typeface="Calibri"/>
+              </a:rPr>
+              <a:t>como</a:t>
+            </a:r>
+            <a:r>
+              <a:rPr lang="en-US" dirty="0">
+                <a:cs typeface="Calibri"/>
+              </a:rPr>
+              <a:t> as do </a:t>
+            </a:r>
+            <a:r>
+              <a:rPr lang="en-US" dirty="0" err="1">
+                <a:cs typeface="Calibri"/>
+              </a:rPr>
+              <a:t>eixo</a:t>
+            </a:r>
+            <a:r>
+              <a:rPr lang="en-US" dirty="0">
+                <a:cs typeface="Calibri"/>
+              </a:rPr>
+              <a:t> x. Nota-se que a </a:t>
+            </a:r>
+            <a:r>
+              <a:rPr lang="en-US" dirty="0" err="1">
+                <a:cs typeface="Calibri"/>
+              </a:rPr>
+              <a:t>utilização</a:t>
+            </a:r>
+            <a:r>
+              <a:rPr lang="en-US" dirty="0">
+                <a:cs typeface="Calibri"/>
+              </a:rPr>
+              <a:t> de features simples </a:t>
+            </a:r>
+            <a:r>
+              <a:rPr lang="en-US" dirty="0" err="1">
+                <a:cs typeface="Calibri"/>
+              </a:rPr>
+              <a:t>pode</a:t>
+            </a:r>
+            <a:r>
+              <a:rPr lang="en-US" dirty="0">
+                <a:cs typeface="Calibri"/>
+              </a:rPr>
+              <a:t> </a:t>
+            </a:r>
+            <a:r>
+              <a:rPr lang="en-US" dirty="0" err="1">
+                <a:cs typeface="Calibri"/>
+              </a:rPr>
+              <a:t>muitas</a:t>
+            </a:r>
+            <a:r>
+              <a:rPr lang="en-US" dirty="0">
+                <a:cs typeface="Calibri"/>
+              </a:rPr>
+              <a:t> </a:t>
+            </a:r>
+            <a:r>
+              <a:rPr lang="en-US" dirty="0" err="1">
+                <a:cs typeface="Calibri"/>
+              </a:rPr>
+              <a:t>vezes</a:t>
+            </a:r>
+            <a:r>
+              <a:rPr lang="en-US" dirty="0">
+                <a:cs typeface="Calibri"/>
+              </a:rPr>
+              <a:t> </a:t>
+            </a:r>
+            <a:r>
+              <a:rPr lang="en-US" dirty="0" err="1">
+                <a:cs typeface="Calibri"/>
+              </a:rPr>
+              <a:t>ser</a:t>
+            </a:r>
+            <a:r>
+              <a:rPr lang="en-US" dirty="0">
+                <a:cs typeface="Calibri"/>
+              </a:rPr>
+              <a:t> </a:t>
+            </a:r>
+            <a:r>
+              <a:rPr lang="en-US" dirty="0" err="1">
+                <a:cs typeface="Calibri"/>
+              </a:rPr>
+              <a:t>suficiente</a:t>
+            </a:r>
+            <a:r>
+              <a:rPr lang="en-US" dirty="0">
+                <a:cs typeface="Calibri"/>
+              </a:rPr>
+              <a:t> para se </a:t>
+            </a:r>
+            <a:r>
+              <a:rPr lang="en-US" dirty="0" err="1">
+                <a:cs typeface="Calibri"/>
+              </a:rPr>
+              <a:t>obetr</a:t>
+            </a:r>
+            <a:r>
+              <a:rPr lang="en-US" dirty="0">
+                <a:cs typeface="Calibri"/>
+              </a:rPr>
+              <a:t> </a:t>
+            </a:r>
+            <a:r>
+              <a:rPr lang="en-US" dirty="0" err="1">
+                <a:cs typeface="Calibri"/>
+              </a:rPr>
+              <a:t>bons</a:t>
+            </a:r>
+            <a:r>
+              <a:rPr lang="en-US" dirty="0">
+                <a:cs typeface="Calibri"/>
+              </a:rPr>
+              <a:t> </a:t>
+            </a:r>
+            <a:r>
+              <a:rPr lang="en-US" dirty="0" err="1">
+                <a:cs typeface="Calibri"/>
+              </a:rPr>
+              <a:t>resultados</a:t>
+            </a:r>
+            <a:r>
+              <a:rPr lang="en-US" dirty="0">
+                <a:cs typeface="Calibri"/>
+              </a:rPr>
+              <a:t> </a:t>
+            </a:r>
+            <a:r>
+              <a:rPr lang="en-US" dirty="0" err="1">
+                <a:cs typeface="Calibri"/>
+              </a:rPr>
+              <a:t>finais</a:t>
+            </a:r>
+            <a:r>
+              <a:rPr lang="en-US" dirty="0">
+                <a:cs typeface="Calibri"/>
+              </a:rPr>
+              <a:t>.</a:t>
+            </a:r>
+          </a:p>
+          <a:p>
+            <a:r>
+              <a:rPr lang="en-US" dirty="0">
+                <a:cs typeface="Calibri"/>
+              </a:rPr>
+              <a:t>Uma das </a:t>
+            </a:r>
+            <a:r>
+              <a:rPr lang="en-US" dirty="0" err="1">
+                <a:cs typeface="Calibri"/>
+              </a:rPr>
+              <a:t>grandes</a:t>
+            </a:r>
+            <a:r>
+              <a:rPr lang="en-US" dirty="0">
+                <a:cs typeface="Calibri"/>
+              </a:rPr>
+              <a:t> </a:t>
+            </a:r>
+            <a:r>
+              <a:rPr lang="en-US" dirty="0" err="1">
+                <a:cs typeface="Calibri"/>
+              </a:rPr>
+              <a:t>dificuldades</a:t>
+            </a:r>
+            <a:r>
+              <a:rPr lang="en-US" dirty="0">
+                <a:cs typeface="Calibri"/>
+              </a:rPr>
+              <a:t> </a:t>
+            </a:r>
+            <a:r>
+              <a:rPr lang="en-US" dirty="0" err="1">
+                <a:cs typeface="Calibri"/>
+              </a:rPr>
+              <a:t>foi</a:t>
+            </a:r>
+            <a:r>
+              <a:rPr lang="en-US" dirty="0">
+                <a:cs typeface="Calibri"/>
+              </a:rPr>
+              <a:t> a </a:t>
+            </a:r>
+            <a:r>
+              <a:rPr lang="en-US" dirty="0" err="1">
+                <a:cs typeface="Calibri"/>
+              </a:rPr>
+              <a:t>segmentação</a:t>
+            </a:r>
+            <a:r>
+              <a:rPr lang="en-US" dirty="0">
+                <a:cs typeface="Calibri"/>
+              </a:rPr>
+              <a:t> </a:t>
+            </a:r>
+            <a:r>
+              <a:rPr lang="en-US" dirty="0" err="1">
+                <a:cs typeface="Calibri"/>
+              </a:rPr>
+              <a:t>correta</a:t>
+            </a:r>
+            <a:r>
+              <a:rPr lang="en-US" dirty="0">
+                <a:cs typeface="Calibri"/>
+              </a:rPr>
+              <a:t> de </a:t>
+            </a:r>
+            <a:r>
+              <a:rPr lang="en-US" dirty="0" err="1">
+                <a:cs typeface="Calibri"/>
+              </a:rPr>
+              <a:t>períodos</a:t>
+            </a:r>
+            <a:r>
+              <a:rPr lang="en-US" dirty="0">
+                <a:cs typeface="Calibri"/>
+              </a:rPr>
+              <a:t> de </a:t>
+            </a:r>
+            <a:r>
+              <a:rPr lang="en-US" dirty="0" err="1">
+                <a:cs typeface="Calibri"/>
+              </a:rPr>
+              <a:t>marcha</a:t>
+            </a:r>
+            <a:r>
+              <a:rPr lang="en-US" dirty="0">
+                <a:cs typeface="Calibri"/>
+              </a:rPr>
+              <a:t>. Este </a:t>
+            </a:r>
+            <a:r>
+              <a:rPr lang="en-US" dirty="0" err="1">
+                <a:cs typeface="Calibri"/>
+              </a:rPr>
+              <a:t>problema</a:t>
+            </a:r>
+            <a:r>
+              <a:rPr lang="en-US" dirty="0">
+                <a:cs typeface="Calibri"/>
+              </a:rPr>
+              <a:t> </a:t>
+            </a:r>
+            <a:r>
+              <a:rPr lang="en-US" dirty="0" err="1">
+                <a:cs typeface="Calibri"/>
+              </a:rPr>
+              <a:t>em</a:t>
+            </a:r>
+            <a:r>
+              <a:rPr lang="en-US" dirty="0">
+                <a:cs typeface="Calibri"/>
+              </a:rPr>
+              <a:t> </a:t>
+            </a:r>
+            <a:r>
+              <a:rPr lang="en-US" dirty="0" err="1">
+                <a:cs typeface="Calibri"/>
+              </a:rPr>
+              <a:t>si</a:t>
+            </a:r>
+            <a:r>
+              <a:rPr lang="en-US" dirty="0">
+                <a:cs typeface="Calibri"/>
+              </a:rPr>
+              <a:t> </a:t>
+            </a:r>
+            <a:r>
+              <a:rPr lang="en-US" dirty="0" err="1">
+                <a:cs typeface="Calibri"/>
+              </a:rPr>
+              <a:t>já</a:t>
+            </a:r>
+            <a:r>
+              <a:rPr lang="en-US" dirty="0">
+                <a:cs typeface="Calibri"/>
+              </a:rPr>
+              <a:t> </a:t>
+            </a:r>
+            <a:r>
+              <a:rPr lang="en-US" dirty="0" err="1">
+                <a:cs typeface="Calibri"/>
+              </a:rPr>
+              <a:t>apresenta</a:t>
+            </a:r>
+            <a:r>
+              <a:rPr lang="en-US" dirty="0">
+                <a:cs typeface="Calibri"/>
+              </a:rPr>
+              <a:t> </a:t>
+            </a:r>
+            <a:r>
+              <a:rPr lang="en-US" dirty="0" err="1">
+                <a:cs typeface="Calibri"/>
+              </a:rPr>
+              <a:t>complexidade</a:t>
+            </a:r>
+            <a:r>
+              <a:rPr lang="en-US" dirty="0">
+                <a:cs typeface="Calibri"/>
+              </a:rPr>
+              <a:t> </a:t>
+            </a:r>
+            <a:r>
+              <a:rPr lang="en-US" dirty="0" err="1">
+                <a:cs typeface="Calibri"/>
+              </a:rPr>
+              <a:t>suficiente</a:t>
+            </a:r>
+            <a:r>
+              <a:rPr lang="en-US" dirty="0">
+                <a:cs typeface="Calibri"/>
+              </a:rPr>
+              <a:t> para </a:t>
+            </a:r>
+            <a:r>
+              <a:rPr lang="en-US" dirty="0" err="1">
+                <a:cs typeface="Calibri"/>
+              </a:rPr>
+              <a:t>ser</a:t>
+            </a:r>
+            <a:r>
+              <a:rPr lang="en-US" dirty="0">
+                <a:cs typeface="Calibri"/>
+              </a:rPr>
+              <a:t> um </a:t>
+            </a:r>
+            <a:r>
+              <a:rPr lang="en-US" dirty="0" err="1">
+                <a:cs typeface="Calibri"/>
+              </a:rPr>
+              <a:t>problema</a:t>
+            </a:r>
+            <a:r>
+              <a:rPr lang="en-US" dirty="0">
+                <a:cs typeface="Calibri"/>
+              </a:rPr>
+              <a:t> de </a:t>
+            </a:r>
+            <a:r>
+              <a:rPr lang="en-US" dirty="0" err="1">
+                <a:cs typeface="Calibri"/>
+              </a:rPr>
+              <a:t>Mahine</a:t>
+            </a:r>
+            <a:r>
+              <a:rPr lang="en-US" dirty="0">
+                <a:cs typeface="Calibri"/>
+              </a:rPr>
+              <a:t> Learning, e </a:t>
+            </a:r>
+            <a:r>
+              <a:rPr lang="en-US" dirty="0" err="1">
+                <a:cs typeface="Calibri"/>
+              </a:rPr>
+              <a:t>os</a:t>
+            </a:r>
+            <a:r>
+              <a:rPr lang="en-US" dirty="0">
+                <a:cs typeface="Calibri"/>
+              </a:rPr>
+              <a:t> </a:t>
+            </a:r>
+            <a:r>
+              <a:rPr lang="en-US" dirty="0" err="1">
+                <a:cs typeface="Calibri"/>
+              </a:rPr>
+              <a:t>nossos</a:t>
+            </a:r>
+            <a:r>
+              <a:rPr lang="en-US" dirty="0">
+                <a:cs typeface="Calibri"/>
+              </a:rPr>
+              <a:t> </a:t>
+            </a:r>
+            <a:r>
+              <a:rPr lang="en-US" dirty="0" err="1">
+                <a:cs typeface="Calibri"/>
+              </a:rPr>
+              <a:t>resultados</a:t>
+            </a:r>
+            <a:r>
+              <a:rPr lang="en-US" dirty="0">
+                <a:cs typeface="Calibri"/>
+              </a:rPr>
+              <a:t> </a:t>
+            </a:r>
+            <a:r>
+              <a:rPr lang="en-US" dirty="0" err="1">
+                <a:cs typeface="Calibri"/>
+              </a:rPr>
+              <a:t>podem</a:t>
+            </a:r>
+            <a:r>
+              <a:rPr lang="en-US" dirty="0">
+                <a:cs typeface="Calibri"/>
+              </a:rPr>
+              <a:t> </a:t>
+            </a:r>
+            <a:r>
+              <a:rPr lang="en-US" dirty="0" err="1">
+                <a:cs typeface="Calibri"/>
+              </a:rPr>
+              <a:t>ser</a:t>
+            </a:r>
+            <a:r>
+              <a:rPr lang="en-US" dirty="0">
+                <a:cs typeface="Calibri"/>
+              </a:rPr>
+              <a:t> </a:t>
+            </a:r>
+            <a:r>
+              <a:rPr lang="en-US" dirty="0" err="1">
+                <a:cs typeface="Calibri"/>
+              </a:rPr>
+              <a:t>profundamente</a:t>
+            </a:r>
+            <a:r>
+              <a:rPr lang="en-US" dirty="0">
+                <a:cs typeface="Calibri"/>
+              </a:rPr>
+              <a:t> </a:t>
+            </a:r>
+            <a:r>
+              <a:rPr lang="en-US" dirty="0" err="1">
+                <a:cs typeface="Calibri"/>
+              </a:rPr>
+              <a:t>melhorados</a:t>
+            </a:r>
+            <a:r>
+              <a:rPr lang="en-US" dirty="0">
+                <a:cs typeface="Calibri"/>
+              </a:rPr>
+              <a:t> com </a:t>
+            </a:r>
+            <a:r>
+              <a:rPr lang="en-US" dirty="0" err="1">
+                <a:cs typeface="Calibri"/>
+              </a:rPr>
+              <a:t>por</a:t>
+            </a:r>
+            <a:r>
+              <a:rPr lang="en-US" dirty="0">
+                <a:cs typeface="Calibri"/>
+              </a:rPr>
+              <a:t> </a:t>
+            </a:r>
+            <a:r>
+              <a:rPr lang="en-US" dirty="0" err="1">
+                <a:cs typeface="Calibri"/>
+              </a:rPr>
+              <a:t>exemplo</a:t>
+            </a:r>
+            <a:r>
+              <a:rPr lang="en-US" dirty="0">
+                <a:cs typeface="Calibri"/>
+              </a:rPr>
+              <a:t> a </a:t>
+            </a:r>
+            <a:r>
+              <a:rPr lang="en-US" dirty="0" err="1">
+                <a:cs typeface="Calibri"/>
+              </a:rPr>
+              <a:t>aplicação</a:t>
+            </a:r>
+            <a:r>
+              <a:rPr lang="en-US" dirty="0">
+                <a:cs typeface="Calibri"/>
+              </a:rPr>
+              <a:t> de supervised learning a um dataset </a:t>
+            </a:r>
+            <a:r>
+              <a:rPr lang="en-US" dirty="0" err="1">
+                <a:cs typeface="Calibri"/>
+              </a:rPr>
+              <a:t>etiquetado</a:t>
+            </a:r>
+            <a:r>
+              <a:rPr lang="en-US" dirty="0">
+                <a:cs typeface="Calibri"/>
+              </a:rPr>
+              <a:t> com as </a:t>
+            </a:r>
+            <a:r>
+              <a:rPr lang="en-US" dirty="0" err="1">
+                <a:cs typeface="Calibri"/>
+              </a:rPr>
+              <a:t>atividades</a:t>
+            </a:r>
+            <a:r>
+              <a:rPr lang="en-US" dirty="0">
+                <a:cs typeface="Calibri"/>
+              </a:rPr>
+              <a:t> que </a:t>
+            </a:r>
+            <a:r>
+              <a:rPr lang="en-US" dirty="0" err="1">
+                <a:cs typeface="Calibri"/>
+              </a:rPr>
+              <a:t>o</a:t>
+            </a:r>
+            <a:r>
+              <a:rPr lang="en-US" dirty="0">
+                <a:cs typeface="Calibri"/>
+              </a:rPr>
+              <a:t> </a:t>
+            </a:r>
+            <a:r>
+              <a:rPr lang="en-US" dirty="0" err="1">
+                <a:cs typeface="Calibri"/>
+              </a:rPr>
+              <a:t>utilizador</a:t>
+            </a:r>
+            <a:r>
+              <a:rPr lang="en-US" dirty="0">
+                <a:cs typeface="Calibri"/>
+              </a:rPr>
+              <a:t> </a:t>
+            </a:r>
+            <a:r>
+              <a:rPr lang="en-US" dirty="0" err="1">
+                <a:cs typeface="Calibri"/>
+              </a:rPr>
+              <a:t>está</a:t>
+            </a:r>
+            <a:r>
+              <a:rPr lang="en-US" dirty="0">
+                <a:cs typeface="Calibri"/>
+              </a:rPr>
+              <a:t> a </a:t>
+            </a:r>
+            <a:r>
+              <a:rPr lang="en-US" dirty="0" err="1">
+                <a:cs typeface="Calibri"/>
+              </a:rPr>
+              <a:t>realizar</a:t>
+            </a:r>
+            <a:r>
+              <a:rPr lang="en-US" dirty="0">
+                <a:cs typeface="Calibri"/>
+              </a:rPr>
+              <a:t> </a:t>
+            </a:r>
+            <a:r>
+              <a:rPr lang="en-US" dirty="0" err="1">
+                <a:cs typeface="Calibri"/>
+              </a:rPr>
+              <a:t>naquele</a:t>
+            </a:r>
+            <a:r>
+              <a:rPr lang="en-US" dirty="0">
+                <a:cs typeface="Calibri"/>
+              </a:rPr>
+              <a:t> </a:t>
+            </a:r>
+            <a:r>
+              <a:rPr lang="en-US" dirty="0" err="1">
+                <a:cs typeface="Calibri"/>
+              </a:rPr>
+              <a:t>momento</a:t>
+            </a:r>
+            <a:r>
+              <a:rPr lang="en-US" dirty="0">
+                <a:cs typeface="Calibri"/>
+              </a:rPr>
+              <a:t>.</a:t>
+            </a:r>
+          </a:p>
+          <a:p>
+            <a:r>
+              <a:rPr lang="en-US" dirty="0"/>
+              <a:t>Durante a </a:t>
+            </a:r>
+            <a:r>
+              <a:rPr lang="en-US" dirty="0" err="1"/>
+              <a:t>resolução</a:t>
+            </a:r>
+            <a:r>
+              <a:rPr lang="en-US" dirty="0"/>
+              <a:t> </a:t>
+            </a:r>
+            <a:r>
+              <a:rPr lang="en-US" dirty="0" err="1"/>
+              <a:t>deste</a:t>
+            </a:r>
+            <a:r>
+              <a:rPr lang="en-US" dirty="0"/>
+              <a:t> </a:t>
+            </a:r>
+            <a:r>
+              <a:rPr lang="en-US" dirty="0" err="1"/>
+              <a:t>desafio</a:t>
+            </a:r>
+            <a:r>
+              <a:rPr lang="en-US" dirty="0"/>
+              <a:t>, </a:t>
+            </a:r>
+            <a:r>
+              <a:rPr lang="en-US" dirty="0" err="1"/>
+              <a:t>houve</a:t>
+            </a:r>
+            <a:r>
+              <a:rPr lang="en-US" dirty="0"/>
+              <a:t> </a:t>
+            </a:r>
+            <a:r>
+              <a:rPr lang="en-US" dirty="0" err="1"/>
+              <a:t>várias</a:t>
+            </a:r>
+            <a:r>
+              <a:rPr lang="en-US" dirty="0"/>
+              <a:t> </a:t>
+            </a:r>
+            <a:r>
+              <a:rPr lang="en-US" dirty="0" err="1"/>
+              <a:t>complicações</a:t>
+            </a:r>
+            <a:r>
+              <a:rPr lang="en-US" dirty="0"/>
+              <a:t> que </a:t>
+            </a:r>
+            <a:r>
+              <a:rPr lang="en-US" dirty="0" err="1"/>
+              <a:t>foram</a:t>
+            </a:r>
+            <a:r>
+              <a:rPr lang="en-US" dirty="0"/>
+              <a:t> </a:t>
+            </a:r>
+            <a:r>
+              <a:rPr lang="en-US" dirty="0" err="1"/>
+              <a:t>superadas</a:t>
+            </a:r>
+            <a:r>
+              <a:rPr lang="en-US" dirty="0"/>
+              <a:t> e </a:t>
+            </a:r>
+            <a:r>
+              <a:rPr lang="en-US" dirty="0" err="1"/>
+              <a:t>obteve</a:t>
+            </a:r>
+            <a:r>
+              <a:rPr lang="en-US" dirty="0"/>
+              <a:t>-se no final um </a:t>
+            </a:r>
+            <a:r>
+              <a:rPr lang="en-US" dirty="0" err="1"/>
+              <a:t>sistema</a:t>
+            </a:r>
+            <a:r>
+              <a:rPr lang="en-US" dirty="0"/>
+              <a:t> de </a:t>
+            </a:r>
+            <a:r>
+              <a:rPr lang="en-US" dirty="0" err="1"/>
+              <a:t>identificação</a:t>
+            </a:r>
+            <a:r>
+              <a:rPr lang="en-US" dirty="0"/>
+              <a:t> de </a:t>
+            </a:r>
+            <a:r>
+              <a:rPr lang="en-US" dirty="0" err="1"/>
+              <a:t>pessoas</a:t>
+            </a:r>
+            <a:r>
+              <a:rPr lang="en-US" dirty="0"/>
+              <a:t> pela forma </a:t>
+            </a:r>
+            <a:r>
+              <a:rPr lang="en-US" dirty="0" err="1"/>
+              <a:t>como</a:t>
+            </a:r>
+            <a:r>
+              <a:rPr lang="en-US" dirty="0"/>
+              <a:t> </a:t>
+            </a:r>
+            <a:r>
+              <a:rPr lang="en-US" dirty="0" err="1"/>
+              <a:t>andam</a:t>
+            </a:r>
+            <a:r>
+              <a:rPr lang="en-US" dirty="0"/>
+              <a:t> </a:t>
+            </a:r>
+            <a:r>
+              <a:rPr lang="en-US" dirty="0" err="1"/>
+              <a:t>através</a:t>
+            </a:r>
+            <a:r>
+              <a:rPr lang="en-US" dirty="0"/>
+              <a:t> do </a:t>
+            </a:r>
+            <a:r>
+              <a:rPr lang="en-US" dirty="0" err="1"/>
+              <a:t>uso</a:t>
+            </a:r>
+            <a:r>
+              <a:rPr lang="en-US" dirty="0"/>
+              <a:t> do </a:t>
+            </a:r>
+            <a:r>
+              <a:rPr lang="en-US" dirty="0" err="1"/>
+              <a:t>seu</a:t>
+            </a:r>
+            <a:r>
+              <a:rPr lang="en-US" dirty="0"/>
+              <a:t> smartphone </a:t>
+            </a:r>
+            <a:r>
+              <a:rPr lang="en-US" dirty="0" err="1"/>
+              <a:t>como</a:t>
+            </a:r>
+            <a:r>
+              <a:rPr lang="en-US" dirty="0"/>
+              <a:t> </a:t>
+            </a:r>
+            <a:r>
+              <a:rPr lang="en-US" dirty="0" err="1"/>
+              <a:t>dispositivo</a:t>
+            </a:r>
+            <a:r>
+              <a:rPr lang="en-US" dirty="0"/>
+              <a:t> de </a:t>
+            </a:r>
+            <a:r>
+              <a:rPr lang="en-US" dirty="0" err="1"/>
+              <a:t>recolha</a:t>
+            </a:r>
+            <a:r>
+              <a:rPr lang="en-US" dirty="0"/>
+              <a:t> de dados, com </a:t>
+            </a:r>
+            <a:r>
+              <a:rPr lang="en-US" dirty="0" err="1"/>
+              <a:t>métricas</a:t>
+            </a:r>
+            <a:r>
+              <a:rPr lang="en-US" dirty="0"/>
+              <a:t> de </a:t>
+            </a:r>
+            <a:r>
+              <a:rPr lang="en-US" dirty="0" err="1"/>
+              <a:t>avaliação</a:t>
+            </a:r>
+            <a:r>
+              <a:rPr lang="en-US" dirty="0"/>
+              <a:t> </a:t>
+            </a:r>
+            <a:r>
+              <a:rPr lang="en-US" dirty="0" err="1"/>
+              <a:t>muito</a:t>
+            </a:r>
+            <a:r>
+              <a:rPr lang="en-US" dirty="0"/>
+              <a:t> boas, </a:t>
+            </a:r>
+            <a:r>
+              <a:rPr lang="en-US" dirty="0" err="1"/>
+              <a:t>quer</a:t>
+            </a:r>
+            <a:r>
+              <a:rPr lang="en-US" dirty="0"/>
+              <a:t> no dataset de </a:t>
+            </a:r>
+            <a:r>
+              <a:rPr lang="en-US" dirty="0" err="1"/>
+              <a:t>treino</a:t>
+            </a:r>
+            <a:r>
+              <a:rPr lang="en-US" dirty="0"/>
+              <a:t>, </a:t>
+            </a:r>
+            <a:r>
+              <a:rPr lang="en-US" dirty="0" err="1"/>
+              <a:t>quer</a:t>
+            </a:r>
+            <a:r>
+              <a:rPr lang="en-US" dirty="0"/>
+              <a:t> no de teste.</a:t>
+            </a:r>
+          </a:p>
+        </p:txBody>
+      </p:sp>
+      <p:sp>
+        <p:nvSpPr>
+          <p:cNvPr id="4" name="Slide Number Placeholder 3"/>
+          <p:cNvSpPr>
+            <a:spLocks noGrp="1"/>
+          </p:cNvSpPr>
+          <p:nvPr>
+            <p:ph type="sldNum" sz="quarter" idx="10"/>
+          </p:nvPr>
+        </p:nvSpPr>
+        <p:spPr/>
+        <p:txBody>
+          <a:bodyPr/>
+          <a:lstStyle/>
+          <a:p>
+            <a:fld id="{5264C8E3-3C8E-4826-9D8E-1AE651C0EA99}" type="slidenum">
+              <a:rPr lang="en-GB"/>
+              <a:t>25</a:t>
+            </a:fld>
+            <a:endParaRPr lang="en-GB"/>
+          </a:p>
+        </p:txBody>
+      </p:sp>
+    </p:spTree>
+    <p:extLst>
+      <p:ext uri="{BB962C8B-B14F-4D97-AF65-F5344CB8AC3E}">
+        <p14:creationId xmlns:p14="http://schemas.microsoft.com/office/powerpoint/2010/main" val="212671514"/>
       </p:ext>
     </p:extLst>
   </p:cSld>
@@ -10330,7 +11720,7 @@
           <a:p>
             <a:fld id="{5264C8E3-3C8E-4826-9D8E-1AE651C0EA99}" type="slidenum">
               <a:rPr lang="en-GB"/>
-              <a:t>‹#›</a:t>
+              <a:t>4</a:t>
             </a:fld>
             <a:endParaRPr lang="en-GB"/>
           </a:p>
@@ -11031,7 +12421,7 @@
           <a:p>
             <a:fld id="{5264C8E3-3C8E-4826-9D8E-1AE651C0EA99}" type="slidenum">
               <a:rPr lang="en-GB"/>
-              <a:t>‹#›</a:t>
+              <a:t>5</a:t>
             </a:fld>
             <a:endParaRPr lang="en-GB"/>
           </a:p>
@@ -11192,7 +12582,7 @@
           <a:p>
             <a:fld id="{5264C8E3-3C8E-4826-9D8E-1AE651C0EA99}" type="slidenum">
               <a:rPr lang="en-GB"/>
-              <a:t>‹#›</a:t>
+              <a:t>6</a:t>
             </a:fld>
             <a:endParaRPr lang="en-GB"/>
           </a:p>
@@ -11912,7 +13302,7 @@
           <a:p>
             <a:fld id="{5264C8E3-3C8E-4826-9D8E-1AE651C0EA99}" type="slidenum">
               <a:rPr lang="en-GB"/>
-              <a:t>‹#›</a:t>
+              <a:t>7</a:t>
             </a:fld>
             <a:endParaRPr lang="en-GB"/>
           </a:p>
@@ -12301,7 +13691,7 @@
           <a:p>
             <a:fld id="{5264C8E3-3C8E-4826-9D8E-1AE651C0EA99}" type="slidenum">
               <a:rPr lang="en-GB"/>
-              <a:t>‹#›</a:t>
+              <a:t>8</a:t>
             </a:fld>
             <a:endParaRPr lang="en-GB"/>
           </a:p>
@@ -13634,7 +15024,7 @@
           <a:p>
             <a:fld id="{5264C8E3-3C8E-4826-9D8E-1AE651C0EA99}" type="slidenum">
               <a:rPr lang="en-GB"/>
-              <a:t>‹#›</a:t>
+              <a:t>9</a:t>
             </a:fld>
             <a:endParaRPr lang="en-GB"/>
           </a:p>
@@ -14517,7 +15907,7 @@
           <a:p>
             <a:fld id="{5264C8E3-3C8E-4826-9D8E-1AE651C0EA99}" type="slidenum">
               <a:rPr lang="en-GB"/>
-              <a:t>‹#›</a:t>
+              <a:t>10</a:t>
             </a:fld>
             <a:endParaRPr lang="en-GB"/>
           </a:p>
@@ -14631,7 +16021,7 @@
           <a:effectLst/>
           <a:extLst>
             <a:ext uri="{91240B29-F687-4f45-9708-019B960494DF}">
-              <a14:hiddenLine xmlns="" xmlns:a14="http://schemas.microsoft.com/office/drawing/2010/main" w="9525">
+              <a14:hiddenLine xmlns:a14="http://schemas.microsoft.com/office/drawing/2010/main" xmlns="" w="9525">
                 <a:solidFill>
                   <a:srgbClr val="000000"/>
                 </a:solidFill>
@@ -14824,7 +16214,7 @@
             <a:fld id="{08B9EBBA-996F-894A-B54A-D6246ED52CEA}" type="datetimeFigureOut">
               <a:rPr lang="en-US" dirty="0"/>
               <a:pPr/>
-              <a:t>4/12/2018</a:t>
+              <a:t>4/13/2018</a:t>
             </a:fld>
             <a:endParaRPr lang="en-US" dirty="0"/>
           </a:p>
@@ -15139,7 +16529,7 @@
             <a:fld id="{18C79C5D-2A6F-F04D-97DA-BEF2467B64E4}" type="datetimeFigureOut">
               <a:rPr lang="en-US" dirty="0"/>
               <a:pPr/>
-              <a:t>4/12/2018</a:t>
+              <a:t>4/13/2018</a:t>
             </a:fld>
             <a:endParaRPr lang="en-US" dirty="0"/>
           </a:p>
@@ -15624,7 +17014,7 @@
             <a:fld id="{8DFA1846-DA80-1C48-A609-854EA85C59AD}" type="datetimeFigureOut">
               <a:rPr lang="en-US" dirty="0"/>
               <a:pPr/>
-              <a:t>4/12/2018</a:t>
+              <a:t>4/13/2018</a:t>
             </a:fld>
             <a:endParaRPr lang="en-US" dirty="0"/>
           </a:p>
@@ -15990,7 +17380,7 @@
             <a:fld id="{FBF54567-0DE4-3F47-BF90-CB84690072F9}" type="datetimeFigureOut">
               <a:rPr lang="en-US" dirty="0"/>
               <a:pPr/>
-              <a:t>4/12/2018</a:t>
+              <a:t>4/13/2018</a:t>
             </a:fld>
             <a:endParaRPr lang="en-US" dirty="0"/>
           </a:p>
@@ -16141,7 +17531,7 @@
           <a:ln/>
           <a:extLst>
             <a:ext uri="{91240B29-F687-4f45-9708-019B960494DF}">
-              <a14:hiddenLine xmlns="" xmlns:a14="http://schemas.microsoft.com/office/drawing/2010/main" w="9525">
+              <a14:hiddenLine xmlns:a14="http://schemas.microsoft.com/office/drawing/2010/main" xmlns="" w="9525">
                 <a:solidFill>
                   <a:srgbClr val="000000"/>
                 </a:solidFill>
@@ -16260,7 +17650,7 @@
             <a:fld id="{C6C52C72-DE31-F449-A4ED-4C594FD91407}" type="datetimeFigureOut">
               <a:rPr lang="en-US" dirty="0"/>
               <a:pPr/>
-              <a:t>4/12/2018</a:t>
+              <a:t>4/13/2018</a:t>
             </a:fld>
             <a:endParaRPr lang="en-US" dirty="0"/>
           </a:p>
@@ -16413,7 +17803,7 @@
           <a:ln/>
           <a:extLst>
             <a:ext uri="{91240B29-F687-4f45-9708-019B960494DF}">
-              <a14:hiddenLine xmlns="" xmlns:a14="http://schemas.microsoft.com/office/drawing/2010/main" w="9525">
+              <a14:hiddenLine xmlns:a14="http://schemas.microsoft.com/office/drawing/2010/main" xmlns="" w="9525">
                 <a:solidFill>
                   <a:srgbClr val="000000"/>
                 </a:solidFill>
@@ -16542,7 +17932,7 @@
             <a:fld id="{ED62726E-379B-B349-9EED-81ED093FA806}" type="datetimeFigureOut">
               <a:rPr lang="en-US" dirty="0"/>
               <a:pPr/>
-              <a:t>4/12/2018</a:t>
+              <a:t>4/13/2018</a:t>
             </a:fld>
             <a:endParaRPr lang="en-US" dirty="0"/>
           </a:p>
@@ -16693,7 +18083,7 @@
           <a:ln/>
           <a:extLst>
             <a:ext uri="{91240B29-F687-4f45-9708-019B960494DF}">
-              <a14:hiddenLine xmlns="" xmlns:a14="http://schemas.microsoft.com/office/drawing/2010/main" w="9525">
+              <a14:hiddenLine xmlns:a14="http://schemas.microsoft.com/office/drawing/2010/main" xmlns="" w="9525">
                 <a:solidFill>
                   <a:srgbClr val="000000"/>
                 </a:solidFill>
@@ -16822,7 +18212,7 @@
             <a:fld id="{9B3A1323-8D79-1946-B0D7-40001CF92E9D}" type="datetimeFigureOut">
               <a:rPr lang="en-US" dirty="0"/>
               <a:pPr/>
-              <a:t>4/12/2018</a:t>
+              <a:t>4/13/2018</a:t>
             </a:fld>
             <a:endParaRPr lang="en-US" dirty="0"/>
           </a:p>
@@ -17162,7 +18552,7 @@
             <a:fld id="{8DFA1846-DA80-1C48-A609-854EA85C59AD}" type="datetimeFigureOut">
               <a:rPr lang="en-US" dirty="0"/>
               <a:pPr/>
-              <a:t>4/12/2018</a:t>
+              <a:t>4/13/2018</a:t>
             </a:fld>
             <a:endParaRPr lang="en-US" dirty="0"/>
           </a:p>
@@ -17313,7 +18703,7 @@
           <a:ln/>
           <a:extLst>
             <a:ext uri="{91240B29-F687-4f45-9708-019B960494DF}">
-              <a14:hiddenLine xmlns="" xmlns:a14="http://schemas.microsoft.com/office/drawing/2010/main" w="9525">
+              <a14:hiddenLine xmlns:a14="http://schemas.microsoft.com/office/drawing/2010/main" xmlns="" w="9525">
                 <a:solidFill>
                   <a:srgbClr val="000000"/>
                 </a:solidFill>
@@ -17498,7 +18888,7 @@
             <a:fld id="{57302355-E14B-8545-A8F8-0FE83CC9D524}" type="datetimeFigureOut">
               <a:rPr lang="en-US" dirty="0"/>
               <a:pPr/>
-              <a:t>4/12/2018</a:t>
+              <a:t>4/13/2018</a:t>
             </a:fld>
             <a:endParaRPr lang="en-US" dirty="0"/>
           </a:p>
@@ -17649,7 +19039,7 @@
           <a:ln/>
           <a:extLst>
             <a:ext uri="{91240B29-F687-4f45-9708-019B960494DF}">
-              <a14:hiddenLine xmlns="" xmlns:a14="http://schemas.microsoft.com/office/drawing/2010/main" w="9525">
+              <a14:hiddenLine xmlns:a14="http://schemas.microsoft.com/office/drawing/2010/main" xmlns="" w="9525">
                 <a:solidFill>
                   <a:srgbClr val="000000"/>
                 </a:solidFill>
@@ -17972,7 +19362,7 @@
             <a:fld id="{02640F58-564D-2B4F-AE67-E407BA4FCF45}" type="datetimeFigureOut">
               <a:rPr lang="en-US" dirty="0"/>
               <a:pPr/>
-              <a:t>4/12/2018</a:t>
+              <a:t>4/13/2018</a:t>
             </a:fld>
             <a:endParaRPr lang="en-US" dirty="0"/>
           </a:p>
@@ -18123,7 +19513,7 @@
           <a:ln/>
           <a:extLst>
             <a:ext uri="{91240B29-F687-4f45-9708-019B960494DF}">
-              <a14:hiddenLine xmlns="" xmlns:a14="http://schemas.microsoft.com/office/drawing/2010/main" w="9525">
+              <a14:hiddenLine xmlns:a14="http://schemas.microsoft.com/office/drawing/2010/main" xmlns="" w="9525">
                 <a:solidFill>
                   <a:srgbClr val="000000"/>
                 </a:solidFill>
@@ -18190,7 +19580,7 @@
             <a:fld id="{F13A34C8-038E-2045-AF43-DF7DBB8E0E9E}" type="datetimeFigureOut">
               <a:rPr lang="en-US" dirty="0"/>
               <a:pPr/>
-              <a:t>4/12/2018</a:t>
+              <a:t>4/13/2018</a:t>
             </a:fld>
             <a:endParaRPr lang="en-US" dirty="0"/>
           </a:p>
@@ -18282,7 +19672,7 @@
             <a:fld id="{8818C68F-D26B-8F47-958C-23B49CF8A634}" type="datetimeFigureOut">
               <a:rPr lang="en-US" dirty="0"/>
               <a:pPr/>
-              <a:t>4/12/2018</a:t>
+              <a:t>4/13/2018</a:t>
             </a:fld>
             <a:endParaRPr lang="en-US" dirty="0"/>
           </a:p>
@@ -18546,7 +19936,7 @@
           <a:ln/>
           <a:extLst>
             <a:ext uri="{91240B29-F687-4f45-9708-019B960494DF}">
-              <a14:hiddenLine xmlns="" xmlns:a14="http://schemas.microsoft.com/office/drawing/2010/main" w="9525">
+              <a14:hiddenLine xmlns:a14="http://schemas.microsoft.com/office/drawing/2010/main" xmlns="" w="9525">
                 <a:solidFill>
                   <a:srgbClr val="000000"/>
                 </a:solidFill>
@@ -18746,7 +20136,7 @@
             <a:fld id="{D0DF5E60-9974-AC48-9591-99C2BB44B7CF}" type="datetimeFigureOut">
               <a:rPr lang="en-US" dirty="0"/>
               <a:pPr/>
-              <a:t>4/12/2018</a:t>
+              <a:t>4/13/2018</a:t>
             </a:fld>
             <a:endParaRPr lang="en-US" dirty="0"/>
           </a:p>
@@ -19056,7 +20446,7 @@
             <a:fld id="{18C79C5D-2A6F-F04D-97DA-BEF2467B64E4}" type="datetimeFigureOut">
               <a:rPr lang="en-US" dirty="0"/>
               <a:pPr/>
-              <a:t>4/12/2018</a:t>
+              <a:t>4/13/2018</a:t>
             </a:fld>
             <a:endParaRPr lang="en-US" dirty="0"/>
           </a:p>
@@ -19323,7 +20713,7 @@
             <a:fld id="{09B482E8-6E0E-1B4F-B1FD-C69DB9E858D9}" type="datetimeFigureOut">
               <a:rPr lang="en-US" dirty="0"/>
               <a:pPr/>
-              <a:t>4/12/2018</a:t>
+              <a:t>4/13/2018</a:t>
             </a:fld>
             <a:endParaRPr lang="en-US" dirty="0"/>
           </a:p>
@@ -21475,7 +22865,7 @@
           <a:lstStyle/>
           <a:p>
             <a:r>
-              <a:rPr lang="en-US" dirty="0" err="1"/>
+              <a:rPr lang="en-US" err="1"/>
               <a:t>Quantifica</a:t>
             </a:r>
             <a:r>
@@ -21483,7 +22873,7 @@
               <a:t> </a:t>
             </a:r>
             <a:r>
-              <a:rPr lang="en-US" dirty="0" err="1"/>
+              <a:rPr lang="en-US" err="1"/>
               <a:t>informação</a:t>
             </a:r>
             <a:r>
@@ -21491,7 +22881,7 @@
               <a:t> que se </a:t>
             </a:r>
             <a:r>
-              <a:rPr lang="en-US" dirty="0" err="1"/>
+              <a:rPr lang="en-US" err="1"/>
               <a:t>pode</a:t>
             </a:r>
             <a:r>
@@ -21499,7 +22889,7 @@
               <a:t> </a:t>
             </a:r>
             <a:r>
-              <a:rPr lang="en-US" dirty="0" err="1"/>
+              <a:rPr lang="en-US" err="1"/>
               <a:t>obter</a:t>
             </a:r>
             <a:r>
@@ -21507,7 +22897,7 @@
               <a:t> </a:t>
             </a:r>
             <a:r>
-              <a:rPr lang="en-US" dirty="0" err="1"/>
+              <a:rPr lang="en-US" err="1"/>
               <a:t>sobre</a:t>
             </a:r>
             <a:r>
@@ -21515,7 +22905,7 @@
               <a:t> </a:t>
             </a:r>
             <a:r>
-              <a:rPr lang="en-US" dirty="0" err="1"/>
+              <a:rPr lang="en-US" err="1"/>
               <a:t>uma</a:t>
             </a:r>
             <a:r>
@@ -21523,7 +22913,7 @@
               <a:t> </a:t>
             </a:r>
             <a:r>
-              <a:rPr lang="en-US" dirty="0" err="1"/>
+              <a:rPr lang="en-US" err="1"/>
               <a:t>variável</a:t>
             </a:r>
             <a:r>
@@ -21531,7 +22921,7 @@
               <a:t> a </a:t>
             </a:r>
             <a:r>
-              <a:rPr lang="en-US" dirty="0" err="1"/>
+              <a:rPr lang="en-US" err="1"/>
               <a:t>partir</a:t>
             </a:r>
             <a:r>
@@ -21539,14 +22929,14 @@
               <a:t> de </a:t>
             </a:r>
             <a:r>
-              <a:rPr lang="en-US" dirty="0" err="1"/>
+              <a:rPr lang="en-US" err="1"/>
               <a:t>outra</a:t>
             </a:r>
           </a:p>
           <a:p>
             <a:pPr lvl="1"/>
             <a:r>
-              <a:rPr lang="en-US" dirty="0" err="1"/>
+              <a:rPr lang="en-US" err="1"/>
               <a:t>Quantificar</a:t>
             </a:r>
             <a:r>
@@ -21554,7 +22944,7 @@
               <a:t> </a:t>
             </a:r>
             <a:r>
-              <a:rPr lang="en-US" dirty="0" err="1"/>
+              <a:rPr lang="en-US" err="1"/>
               <a:t>informação</a:t>
             </a:r>
             <a:r>
@@ -21562,7 +22952,7 @@
               <a:t> </a:t>
             </a:r>
             <a:r>
-              <a:rPr lang="en-US" dirty="0" err="1"/>
+              <a:rPr lang="en-US" err="1"/>
               <a:t>útil</a:t>
             </a:r>
             <a:r>
@@ -21570,7 +22960,7 @@
               <a:t> que se </a:t>
             </a:r>
             <a:r>
-              <a:rPr lang="en-US" dirty="0" err="1"/>
+              <a:rPr lang="en-US" err="1"/>
               <a:t>pode</a:t>
             </a:r>
             <a:r>
@@ -21578,7 +22968,7 @@
               <a:t> </a:t>
             </a:r>
             <a:r>
-              <a:rPr lang="en-US" dirty="0" err="1"/>
+              <a:rPr lang="en-US" err="1"/>
               <a:t>obter</a:t>
             </a:r>
             <a:r>
@@ -21586,7 +22976,7 @@
               <a:t> de </a:t>
             </a:r>
             <a:r>
-              <a:rPr lang="en-US" dirty="0" err="1"/>
+              <a:rPr lang="en-US" err="1"/>
               <a:t>uma</a:t>
             </a:r>
             <a:r>
@@ -21594,7 +22984,7 @@
               <a:t> feature para o </a:t>
             </a:r>
             <a:r>
-              <a:rPr lang="en-US" dirty="0" err="1"/>
+              <a:rPr lang="en-US" err="1"/>
               <a:t>problema</a:t>
             </a:r>
             <a:r>
@@ -21602,7 +22992,7 @@
               <a:t> de </a:t>
             </a:r>
             <a:r>
-              <a:rPr lang="en-US" dirty="0" err="1"/>
+              <a:rPr lang="en-US" err="1"/>
               <a:t>classificação</a:t>
             </a:r>
           </a:p>
@@ -21612,7 +23002,7 @@
               <a:t>Features </a:t>
             </a:r>
             <a:r>
-              <a:rPr lang="en-US" dirty="0" err="1"/>
+              <a:rPr lang="en-US" err="1"/>
               <a:t>ordenadas</a:t>
             </a:r>
             <a:r>
@@ -21620,7 +23010,7 @@
               <a:t> </a:t>
             </a:r>
             <a:r>
-              <a:rPr lang="en-US" dirty="0" err="1"/>
+              <a:rPr lang="en-US" err="1"/>
               <a:t>segundo</a:t>
             </a:r>
             <a:r>
@@ -21630,18 +23020,14 @@
           </a:p>
           <a:p>
             <a:r>
-              <a:rPr lang="en-US" dirty="0" err="1"/>
+              <a:rPr lang="en-US" err="1"/>
               <a:t>Selecionam</a:t>
             </a:r>
             <a:r>
-              <a:rPr lang="en-US" dirty="0"/>
-              <a:t>-se as 15% </a:t>
-            </a:r>
-            <a:r>
-              <a:rPr lang="en-US" dirty="0" err="1"/>
-              <a:t>melhores</a:t>
-            </a:r>
-            <a:endParaRPr lang="en-GB" dirty="0" err="1"/>
+              <a:rPr lang="en-US"/>
+              <a:t>-se as 45% melhores</a:t>
+            </a:r>
+            <a:endParaRPr lang="en-GB"/>
           </a:p>
         </p:txBody>
       </p:sp>
@@ -21926,6 +23312,12 @@
               <a:t>SVM</a:t>
             </a:r>
             <a:endParaRPr lang="en-US" dirty="0"/>
+          </a:p>
+          <a:p>
+            <a:r>
+              <a:rPr lang="en-GB" dirty="0"/>
+              <a:t>One Vs Rest SVM</a:t>
+            </a:r>
           </a:p>
           <a:p>
             <a:r>
@@ -22276,15 +23668,7 @@
             </a:r>
             <a:r>
               <a:rPr lang="en-GB" dirty="0"/>
-              <a:t> de C e </a:t>
-            </a:r>
-            <a:r>
-              <a:rPr lang="en-GB" dirty="0" err="1"/>
-              <a:t>gama</a:t>
-            </a:r>
-            <a:r>
-              <a:rPr lang="en-GB" dirty="0"/>
-              <a:t> da SVM </a:t>
+              <a:t> de C e gamma da SVM </a:t>
             </a:r>
           </a:p>
           <a:p>
@@ -22313,25 +23697,21 @@
             </a:r>
             <a:r>
               <a:rPr lang="en-GB" dirty="0"/>
-              <a:t> = </a:t>
+              <a:t> = 45%</a:t>
             </a:r>
           </a:p>
           <a:p>
             <a:pPr lvl="1"/>
             <a:r>
               <a:rPr lang="en-GB" dirty="0"/>
-              <a:t>C = </a:t>
+              <a:t>C = 10</a:t>
             </a:r>
           </a:p>
           <a:p>
             <a:pPr lvl="1"/>
             <a:r>
-              <a:rPr lang="en-GB" dirty="0" err="1"/>
-              <a:t>gama</a:t>
-            </a:r>
-            <a:r>
               <a:rPr lang="en-GB" dirty="0"/>
-              <a:t> =</a:t>
+              <a:t>gamma = 0.001</a:t>
             </a:r>
           </a:p>
           <a:p>
@@ -22924,53 +24304,105 @@
           </a:p>
         </p:txBody>
       </p:sp>
-      <p:sp>
-        <p:nvSpPr>
-          <p:cNvPr id="3" name="Content Placeholder 2">
+      <p:pic>
+        <p:nvPicPr>
+          <p:cNvPr id="5" name="Picture 5" descr="A screenshot of a cell phone&#10;&#10;Description generated with very high confidence">
             <a:extLst>
               <a:ext uri="{FF2B5EF4-FFF2-40B4-BE49-F238E27FC236}">
-                <a16:creationId xmlns:a16="http://schemas.microsoft.com/office/drawing/2014/main" id="{22F06C4A-3881-48E2-8754-8B770D806DC2}"/>
+                <a16:creationId xmlns:a16="http://schemas.microsoft.com/office/drawing/2014/main" id="{93170651-4B86-4CB8-9FF4-7B63F8CEAE1A}"/>
               </a:ext>
             </a:extLst>
           </p:cNvPr>
-          <p:cNvSpPr>
-            <a:spLocks noGrp="1"/>
-          </p:cNvSpPr>
+          <p:cNvPicPr>
+            <a:picLocks noGrp="1" noChangeAspect="1"/>
+          </p:cNvPicPr>
           <p:nvPr>
             <p:ph sz="half" idx="1"/>
           </p:nvPr>
-        </p:nvSpPr>
-        <p:spPr/>
-        <p:txBody>
-          <a:bodyPr/>
-          <a:lstStyle/>
-          <a:p>
-            <a:endParaRPr lang="en-GB"/>
-          </a:p>
-        </p:txBody>
-      </p:sp>
-      <p:sp>
-        <p:nvSpPr>
-          <p:cNvPr id="4" name="Content Placeholder 3">
+        </p:nvPicPr>
+        <p:blipFill>
+          <a:blip r:embed="rId3"/>
+          <a:stretch>
+            <a:fillRect/>
+          </a:stretch>
+        </p:blipFill>
+        <p:spPr>
+          <a:xfrm>
+            <a:off x="985807" y="2222287"/>
+            <a:ext cx="4851684" cy="3638763"/>
+          </a:xfrm>
+          <a:prstGeom prst="rect">
+            <a:avLst/>
+          </a:prstGeom>
+        </p:spPr>
+      </p:pic>
+      <p:pic>
+        <p:nvPicPr>
+          <p:cNvPr id="7" name="Picture 7" descr="A screenshot of a cell phone&#10;&#10;Description generated with high confidence">
             <a:extLst>
               <a:ext uri="{FF2B5EF4-FFF2-40B4-BE49-F238E27FC236}">
-                <a16:creationId xmlns:a16="http://schemas.microsoft.com/office/drawing/2014/main" id="{63747B8B-3A7F-4098-8B34-BD7BE36A7A0A}"/>
+                <a16:creationId xmlns:a16="http://schemas.microsoft.com/office/drawing/2014/main" id="{4858F68E-8982-4198-BD76-2052D0C0236F}"/>
               </a:ext>
             </a:extLst>
           </p:cNvPr>
-          <p:cNvSpPr>
-            <a:spLocks noGrp="1"/>
-          </p:cNvSpPr>
+          <p:cNvPicPr>
+            <a:picLocks noGrp="1" noChangeAspect="1"/>
+          </p:cNvPicPr>
           <p:nvPr>
             <p:ph sz="half" idx="2"/>
           </p:nvPr>
+        </p:nvPicPr>
+        <p:blipFill>
+          <a:blip r:embed="rId4"/>
+          <a:stretch>
+            <a:fillRect/>
+          </a:stretch>
+        </p:blipFill>
+        <p:spPr>
+          <a:xfrm>
+            <a:off x="7263971" y="2222287"/>
+            <a:ext cx="3041472" cy="3638764"/>
+          </a:xfrm>
+          <a:prstGeom prst="rect">
+            <a:avLst/>
+          </a:prstGeom>
+        </p:spPr>
+      </p:pic>
+      <p:sp>
+        <p:nvSpPr>
+          <p:cNvPr id="9" name="TextBox 8">
+            <a:extLst>
+              <a:ext uri="{FF2B5EF4-FFF2-40B4-BE49-F238E27FC236}">
+                <a16:creationId xmlns:a16="http://schemas.microsoft.com/office/drawing/2014/main" id="{559BBFC3-7832-4453-B383-E26679D58CEA}"/>
+              </a:ext>
+            </a:extLst>
+          </p:cNvPr>
+          <p:cNvSpPr txBox="1"/>
+          <p:nvPr/>
         </p:nvSpPr>
-        <p:spPr/>
+        <p:spPr>
+          <a:xfrm>
+            <a:off x="7269190" y="6039930"/>
+            <a:ext cx="3045125" cy="646331"/>
+          </a:xfrm>
+          <a:prstGeom prst="rect">
+            <a:avLst/>
+          </a:prstGeom>
+        </p:spPr>
         <p:txBody>
-          <a:bodyPr/>
+          <a:bodyPr rot="0" spcFirstLastPara="0" vertOverflow="overflow" horzOverflow="overflow" vert="horz" wrap="square" lIns="91440" tIns="45720" rIns="91440" bIns="45720" numCol="1" spcCol="0" rtlCol="0" fromWordArt="0" anchor="t" anchorCtr="0" forceAA="0" compatLnSpc="1">
+            <a:prstTxWarp prst="textNoShape">
+              <a:avLst/>
+            </a:prstTxWarp>
+            <a:spAutoFit/>
+          </a:bodyPr>
           <a:lstStyle/>
           <a:p>
-            <a:endParaRPr lang="en-GB"/>
+            <a:pPr algn="ctr"/>
+            <a:r>
+              <a:rPr lang="en-GB" dirty="0"/>
+              <a:t>Classification Report (accuracy = 95.9%)</a:t>
+            </a:r>
           </a:p>
         </p:txBody>
       </p:sp>
@@ -23037,31 +24469,37 @@
           </a:p>
         </p:txBody>
       </p:sp>
-      <p:sp>
-        <p:nvSpPr>
-          <p:cNvPr id="3" name="Content Placeholder 2">
+      <p:pic>
+        <p:nvPicPr>
+          <p:cNvPr id="5" name="Picture 5" descr="A screenshot of a video game&#10;&#10;Description generated with high confidence">
             <a:extLst>
               <a:ext uri="{FF2B5EF4-FFF2-40B4-BE49-F238E27FC236}">
-                <a16:creationId xmlns:a16="http://schemas.microsoft.com/office/drawing/2014/main" id="{16D23391-AD4B-49A7-86C7-D9BF481DBDF3}"/>
+                <a16:creationId xmlns:a16="http://schemas.microsoft.com/office/drawing/2014/main" id="{2504890E-304B-4026-8A9F-2AE08E2B4741}"/>
               </a:ext>
             </a:extLst>
           </p:cNvPr>
-          <p:cNvSpPr>
-            <a:spLocks noGrp="1"/>
-          </p:cNvSpPr>
+          <p:cNvPicPr>
+            <a:picLocks noGrp="1" noChangeAspect="1"/>
+          </p:cNvPicPr>
           <p:nvPr>
             <p:ph sz="half" idx="1"/>
           </p:nvPr>
-        </p:nvSpPr>
-        <p:spPr/>
-        <p:txBody>
-          <a:bodyPr/>
-          <a:lstStyle/>
-          <a:p>
-            <a:endParaRPr lang="en-GB"/>
-          </a:p>
-        </p:txBody>
-      </p:sp>
+        </p:nvPicPr>
+        <p:blipFill rotWithShape="1">
+          <a:blip r:embed="rId3"/>
+          <a:srcRect t="13834" r="296" b="10277"/>
+          <a:stretch/>
+        </p:blipFill>
+        <p:spPr>
+          <a:xfrm>
+            <a:off x="985807" y="2725494"/>
+            <a:ext cx="4837333" cy="2761440"/>
+          </a:xfrm>
+          <a:prstGeom prst="rect">
+            <a:avLst/>
+          </a:prstGeom>
+        </p:spPr>
+      </p:pic>
       <p:sp>
         <p:nvSpPr>
           <p:cNvPr id="4" name="Content Placeholder 3">
@@ -23083,7 +24521,110 @@
           <a:bodyPr/>
           <a:lstStyle/>
           <a:p>
-            <a:endParaRPr lang="en-GB"/>
+            <a:r>
+              <a:rPr lang="en-GB" dirty="0" err="1"/>
+              <a:t>Cada</a:t>
+            </a:r>
+            <a:r>
+              <a:rPr lang="en-GB" dirty="0"/>
+              <a:t> </a:t>
+            </a:r>
+            <a:r>
+              <a:rPr lang="en-GB" dirty="0" err="1"/>
+              <a:t>sessão</a:t>
+            </a:r>
+            <a:r>
+              <a:rPr lang="en-GB" dirty="0"/>
+              <a:t> é </a:t>
+            </a:r>
+            <a:r>
+              <a:rPr lang="en-GB" dirty="0" err="1"/>
+              <a:t>sujeita</a:t>
+            </a:r>
+            <a:r>
+              <a:rPr lang="en-GB" dirty="0"/>
+              <a:t> à </a:t>
+            </a:r>
+            <a:r>
+              <a:rPr lang="en-GB" dirty="0" err="1"/>
+              <a:t>mesma</a:t>
+            </a:r>
+            <a:r>
+              <a:rPr lang="en-GB" dirty="0"/>
+              <a:t> pipeline</a:t>
+            </a:r>
+          </a:p>
+          <a:p>
+            <a:r>
+              <a:rPr lang="en-GB" dirty="0" err="1"/>
+              <a:t>Previsões</a:t>
+            </a:r>
+            <a:r>
+              <a:rPr lang="en-GB" dirty="0"/>
+              <a:t> </a:t>
+            </a:r>
+            <a:r>
+              <a:rPr lang="en-GB" dirty="0" err="1"/>
+              <a:t>por</a:t>
+            </a:r>
+            <a:r>
+              <a:rPr lang="en-GB" dirty="0"/>
+              <a:t> </a:t>
+            </a:r>
+            <a:r>
+              <a:rPr lang="en-GB" dirty="0" err="1"/>
+              <a:t>janela</a:t>
+            </a:r>
+          </a:p>
+          <a:p>
+            <a:r>
+              <a:rPr lang="en-GB" dirty="0" err="1"/>
+              <a:t>Probabilidades</a:t>
+            </a:r>
+            <a:r>
+              <a:rPr lang="en-GB" dirty="0"/>
+              <a:t> de </a:t>
+            </a:r>
+            <a:r>
+              <a:rPr lang="en-GB" dirty="0" err="1"/>
+              <a:t>cada</a:t>
+            </a:r>
+            <a:r>
+              <a:rPr lang="en-GB" dirty="0"/>
+              <a:t> </a:t>
+            </a:r>
+            <a:r>
+              <a:rPr lang="en-GB" dirty="0" err="1"/>
+              <a:t>utilizador</a:t>
+            </a:r>
+            <a:r>
+              <a:rPr lang="en-GB" dirty="0"/>
+              <a:t> </a:t>
+            </a:r>
+            <a:r>
+              <a:rPr lang="en-GB" dirty="0" err="1"/>
+              <a:t>são</a:t>
+            </a:r>
+            <a:r>
+              <a:rPr lang="en-GB" dirty="0"/>
+              <a:t> </a:t>
+            </a:r>
+            <a:r>
+              <a:rPr lang="en-GB" dirty="0" err="1"/>
+              <a:t>multiplicadas</a:t>
+            </a:r>
+            <a:r>
+              <a:rPr lang="en-GB" dirty="0"/>
+              <a:t> e </a:t>
+            </a:r>
+            <a:r>
+              <a:rPr lang="en-GB" dirty="0" err="1"/>
+              <a:t>normalizadas</a:t>
+            </a:r>
+            <a:r>
+              <a:rPr lang="en-GB" dirty="0"/>
+              <a:t>.</a:t>
+            </a:r>
           </a:p>
         </p:txBody>
       </p:sp>
@@ -23091,6 +24632,636 @@
     <p:extLst>
       <p:ext uri="{BB962C8B-B14F-4D97-AF65-F5344CB8AC3E}">
         <p14:creationId xmlns:p14="http://schemas.microsoft.com/office/powerpoint/2010/main" val="1371402749"/>
+      </p:ext>
+    </p:extLst>
+  </p:cSld>
+  <p:clrMapOvr>
+    <a:masterClrMapping/>
+  </p:clrMapOvr>
+</p:sld>
+</file>
+
+<file path=ppt/slides/slide23.xml><?xml version="1.0" encoding="utf-8"?>
+<p:sld xmlns:a="http://schemas.openxmlformats.org/drawingml/2006/main" xmlns:r="http://schemas.openxmlformats.org/officeDocument/2006/relationships" xmlns:p="http://schemas.openxmlformats.org/presentationml/2006/main">
+  <p:cSld>
+    <p:spTree>
+      <p:nvGrpSpPr>
+        <p:cNvPr id="1" name=""/>
+        <p:cNvGrpSpPr/>
+        <p:nvPr/>
+      </p:nvGrpSpPr>
+      <p:grpSpPr>
+        <a:xfrm>
+          <a:off x="0" y="0"/>
+          <a:ext cx="0" cy="0"/>
+          <a:chOff x="0" y="0"/>
+          <a:chExt cx="0" cy="0"/>
+        </a:xfrm>
+      </p:grpSpPr>
+      <p:pic>
+        <p:nvPicPr>
+          <p:cNvPr id="5" name="Picture 5" descr="A screenshot of a cell phone&#10;&#10;Description generated with very high confidence">
+            <a:extLst>
+              <a:ext uri="{FF2B5EF4-FFF2-40B4-BE49-F238E27FC236}">
+                <a16:creationId xmlns:a16="http://schemas.microsoft.com/office/drawing/2014/main" id="{5B20C098-2074-4B1F-944C-3A84147C14DD}"/>
+              </a:ext>
+            </a:extLst>
+          </p:cNvPr>
+          <p:cNvPicPr>
+            <a:picLocks noGrp="1" noChangeAspect="1"/>
+          </p:cNvPicPr>
+          <p:nvPr>
+            <p:ph type="pic" sz="quarter" idx="13"/>
+          </p:nvPr>
+        </p:nvPicPr>
+        <p:blipFill rotWithShape="1">
+          <a:blip r:embed="rId3"/>
+          <a:srcRect l="143" t="4051" r="716" b="506"/>
+          <a:stretch/>
+        </p:blipFill>
+        <p:spPr>
+          <a:xfrm>
+            <a:off x="1049545" y="704490"/>
+            <a:ext cx="9942378" cy="5419445"/>
+          </a:xfrm>
+          <a:prstGeom prst="rect">
+            <a:avLst/>
+          </a:prstGeom>
+        </p:spPr>
+      </p:pic>
+    </p:spTree>
+    <p:extLst>
+      <p:ext uri="{BB962C8B-B14F-4D97-AF65-F5344CB8AC3E}">
+        <p14:creationId xmlns:p14="http://schemas.microsoft.com/office/powerpoint/2010/main" val="3276957946"/>
+      </p:ext>
+    </p:extLst>
+  </p:cSld>
+  <p:clrMapOvr>
+    <a:masterClrMapping/>
+  </p:clrMapOvr>
+</p:sld>
+</file>
+
+<file path=ppt/slides/slide24.xml><?xml version="1.0" encoding="utf-8"?>
+<p:sld xmlns:a="http://schemas.openxmlformats.org/drawingml/2006/main" xmlns:r="http://schemas.openxmlformats.org/officeDocument/2006/relationships" xmlns:p="http://schemas.openxmlformats.org/presentationml/2006/main">
+  <p:cSld>
+    <p:spTree>
+      <p:nvGrpSpPr>
+        <p:cNvPr id="1" name=""/>
+        <p:cNvGrpSpPr/>
+        <p:nvPr/>
+      </p:nvGrpSpPr>
+      <p:grpSpPr>
+        <a:xfrm>
+          <a:off x="0" y="0"/>
+          <a:ext cx="0" cy="0"/>
+          <a:chOff x="0" y="0"/>
+          <a:chExt cx="0" cy="0"/>
+        </a:xfrm>
+      </p:grpSpPr>
+      <p:sp>
+        <p:nvSpPr>
+          <p:cNvPr id="2" name="Title 1">
+            <a:extLst>
+              <a:ext uri="{FF2B5EF4-FFF2-40B4-BE49-F238E27FC236}">
+                <a16:creationId xmlns:a16="http://schemas.microsoft.com/office/drawing/2014/main" id="{2216F5AD-7FA1-42FD-9BA1-4E42BEC086FF}"/>
+              </a:ext>
+            </a:extLst>
+          </p:cNvPr>
+          <p:cNvSpPr>
+            <a:spLocks noGrp="1"/>
+          </p:cNvSpPr>
+          <p:nvPr>
+            <p:ph type="title"/>
+          </p:nvPr>
+        </p:nvSpPr>
+        <p:spPr/>
+        <p:txBody>
+          <a:bodyPr/>
+          <a:lstStyle/>
+          <a:p>
+            <a:r>
+              <a:rPr lang="en-GB" dirty="0" err="1"/>
+              <a:t>Conclusões</a:t>
+            </a:r>
+          </a:p>
+        </p:txBody>
+      </p:sp>
+      <p:sp>
+        <p:nvSpPr>
+          <p:cNvPr id="3" name="Text Placeholder 2">
+            <a:extLst>
+              <a:ext uri="{FF2B5EF4-FFF2-40B4-BE49-F238E27FC236}">
+                <a16:creationId xmlns:a16="http://schemas.microsoft.com/office/drawing/2014/main" id="{AB865049-4B22-46F1-8B79-D9F12E0D40ED}"/>
+              </a:ext>
+            </a:extLst>
+          </p:cNvPr>
+          <p:cNvSpPr>
+            <a:spLocks noGrp="1"/>
+          </p:cNvSpPr>
+          <p:nvPr>
+            <p:ph type="body" idx="1"/>
+          </p:nvPr>
+        </p:nvSpPr>
+        <p:spPr/>
+        <p:txBody>
+          <a:bodyPr/>
+          <a:lstStyle/>
+          <a:p>
+            <a:endParaRPr lang="en-GB"/>
+          </a:p>
+        </p:txBody>
+      </p:sp>
+    </p:spTree>
+    <p:extLst>
+      <p:ext uri="{BB962C8B-B14F-4D97-AF65-F5344CB8AC3E}">
+        <p14:creationId xmlns:p14="http://schemas.microsoft.com/office/powerpoint/2010/main" val="3369127548"/>
+      </p:ext>
+    </p:extLst>
+  </p:cSld>
+  <p:clrMapOvr>
+    <a:masterClrMapping/>
+  </p:clrMapOvr>
+</p:sld>
+</file>
+
+<file path=ppt/slides/slide25.xml><?xml version="1.0" encoding="utf-8"?>
+<p:sld xmlns:a="http://schemas.openxmlformats.org/drawingml/2006/main" xmlns:r="http://schemas.openxmlformats.org/officeDocument/2006/relationships" xmlns:p="http://schemas.openxmlformats.org/presentationml/2006/main">
+  <p:cSld>
+    <p:spTree>
+      <p:nvGrpSpPr>
+        <p:cNvPr id="1" name=""/>
+        <p:cNvGrpSpPr/>
+        <p:nvPr/>
+      </p:nvGrpSpPr>
+      <p:grpSpPr>
+        <a:xfrm>
+          <a:off x="0" y="0"/>
+          <a:ext cx="0" cy="0"/>
+          <a:chOff x="0" y="0"/>
+          <a:chExt cx="0" cy="0"/>
+        </a:xfrm>
+      </p:grpSpPr>
+      <p:sp>
+        <p:nvSpPr>
+          <p:cNvPr id="2" name="Title 1">
+            <a:extLst>
+              <a:ext uri="{FF2B5EF4-FFF2-40B4-BE49-F238E27FC236}">
+                <a16:creationId xmlns:a16="http://schemas.microsoft.com/office/drawing/2014/main" id="{455FB6E1-7F03-41DD-BD1C-997E4B9A09B6}"/>
+              </a:ext>
+            </a:extLst>
+          </p:cNvPr>
+          <p:cNvSpPr>
+            <a:spLocks noGrp="1"/>
+          </p:cNvSpPr>
+          <p:nvPr>
+            <p:ph type="title"/>
+          </p:nvPr>
+        </p:nvSpPr>
+        <p:spPr/>
+        <p:txBody>
+          <a:bodyPr/>
+          <a:lstStyle/>
+          <a:p>
+            <a:r>
+              <a:rPr lang="en-GB" dirty="0" err="1"/>
+              <a:t>Conclusões</a:t>
+            </a:r>
+          </a:p>
+        </p:txBody>
+      </p:sp>
+      <p:sp>
+        <p:nvSpPr>
+          <p:cNvPr id="3" name="Content Placeholder 2">
+            <a:extLst>
+              <a:ext uri="{FF2B5EF4-FFF2-40B4-BE49-F238E27FC236}">
+                <a16:creationId xmlns:a16="http://schemas.microsoft.com/office/drawing/2014/main" id="{8F03A7E2-A7CC-41CB-AED9-2514546C1595}"/>
+              </a:ext>
+            </a:extLst>
+          </p:cNvPr>
+          <p:cNvSpPr>
+            <a:spLocks noGrp="1"/>
+          </p:cNvSpPr>
+          <p:nvPr>
+            <p:ph idx="1"/>
+          </p:nvPr>
+        </p:nvSpPr>
+        <p:spPr/>
+        <p:txBody>
+          <a:bodyPr/>
+          <a:lstStyle/>
+          <a:p>
+            <a:r>
+              <a:rPr lang="en-GB" dirty="0"/>
+              <a:t>Features </a:t>
+            </a:r>
+            <a:r>
+              <a:rPr lang="en-GB" dirty="0" err="1"/>
+              <a:t>mais</a:t>
+            </a:r>
+            <a:r>
+              <a:rPr lang="en-GB" dirty="0"/>
+              <a:t> </a:t>
+            </a:r>
+            <a:r>
+              <a:rPr lang="en-GB" dirty="0" err="1"/>
+              <a:t>importantes</a:t>
+            </a:r>
+            <a:r>
+              <a:rPr lang="en-GB" dirty="0"/>
+              <a:t> </a:t>
+            </a:r>
+            <a:r>
+              <a:rPr lang="en-GB" dirty="0" err="1"/>
+              <a:t>são</a:t>
+            </a:r>
+            <a:r>
+              <a:rPr lang="en-GB" dirty="0"/>
+              <a:t> as do </a:t>
+            </a:r>
+            <a:r>
+              <a:rPr lang="en-GB" dirty="0" err="1"/>
+              <a:t>eixo</a:t>
+            </a:r>
+            <a:r>
+              <a:rPr lang="en-GB" dirty="0"/>
+              <a:t> x dos </a:t>
+            </a:r>
+            <a:r>
+              <a:rPr lang="en-GB" dirty="0" err="1"/>
+              <a:t>sensores</a:t>
+            </a:r>
+          </a:p>
+          <a:p>
+            <a:r>
+              <a:rPr lang="en-GB" dirty="0" err="1"/>
+              <a:t>Acelerómetro</a:t>
+            </a:r>
+            <a:r>
+              <a:rPr lang="en-GB" dirty="0"/>
+              <a:t> </a:t>
+            </a:r>
+            <a:r>
+              <a:rPr lang="en-GB" dirty="0" err="1"/>
+              <a:t>apresenta</a:t>
+            </a:r>
+            <a:r>
+              <a:rPr lang="en-GB" dirty="0"/>
+              <a:t> </a:t>
+            </a:r>
+            <a:r>
+              <a:rPr lang="en-GB" dirty="0" err="1"/>
+              <a:t>mais</a:t>
+            </a:r>
+            <a:r>
+              <a:rPr lang="en-GB" dirty="0"/>
+              <a:t> </a:t>
+            </a:r>
+            <a:r>
+              <a:rPr lang="en-GB" dirty="0" err="1"/>
+              <a:t>informação</a:t>
+            </a:r>
+          </a:p>
+          <a:p>
+            <a:r>
+              <a:rPr lang="en-GB" dirty="0"/>
+              <a:t>Features </a:t>
+            </a:r>
+            <a:r>
+              <a:rPr lang="en-GB" dirty="0" err="1"/>
+              <a:t>estatísticas</a:t>
+            </a:r>
+            <a:r>
+              <a:rPr lang="en-GB" dirty="0"/>
+              <a:t> simples, </a:t>
+            </a:r>
+            <a:r>
+              <a:rPr lang="en-GB" dirty="0" err="1"/>
+              <a:t>como</a:t>
+            </a:r>
+            <a:r>
+              <a:rPr lang="en-GB" dirty="0"/>
+              <a:t> a </a:t>
+            </a:r>
+            <a:r>
+              <a:rPr lang="en-GB" dirty="0" err="1"/>
+              <a:t>média</a:t>
+            </a:r>
+            <a:r>
+              <a:rPr lang="en-GB" dirty="0"/>
+              <a:t>, </a:t>
+            </a:r>
+            <a:r>
+              <a:rPr lang="en-GB" dirty="0" err="1"/>
+              <a:t>já</a:t>
+            </a:r>
+            <a:r>
+              <a:rPr lang="en-GB" dirty="0"/>
+              <a:t> </a:t>
+            </a:r>
+            <a:r>
+              <a:rPr lang="en-GB" dirty="0" err="1"/>
+              <a:t>são</a:t>
+            </a:r>
+            <a:r>
+              <a:rPr lang="en-GB" dirty="0"/>
+              <a:t> </a:t>
+            </a:r>
+            <a:r>
+              <a:rPr lang="en-GB" dirty="0" err="1"/>
+              <a:t>suficientes</a:t>
+            </a:r>
+            <a:r>
+              <a:rPr lang="en-GB" dirty="0"/>
+              <a:t> para </a:t>
+            </a:r>
+            <a:r>
+              <a:rPr lang="en-GB" dirty="0" err="1"/>
+              <a:t>classificação</a:t>
+            </a:r>
+          </a:p>
+          <a:p>
+            <a:r>
+              <a:rPr lang="en-GB" dirty="0" err="1"/>
+              <a:t>Segmentação</a:t>
+            </a:r>
+            <a:r>
+              <a:rPr lang="en-GB" dirty="0"/>
+              <a:t> de </a:t>
+            </a:r>
+            <a:r>
+              <a:rPr lang="en-GB" dirty="0" err="1"/>
+              <a:t>períodos</a:t>
+            </a:r>
+            <a:r>
+              <a:rPr lang="en-GB" dirty="0"/>
+              <a:t> de </a:t>
+            </a:r>
+            <a:r>
+              <a:rPr lang="en-GB" dirty="0" err="1"/>
+              <a:t>marcha</a:t>
+            </a:r>
+            <a:r>
+              <a:rPr lang="en-GB" dirty="0"/>
+              <a:t> </a:t>
+            </a:r>
+            <a:r>
+              <a:rPr lang="en-GB" dirty="0" err="1"/>
+              <a:t>pode</a:t>
+            </a:r>
+            <a:r>
+              <a:rPr lang="en-GB" dirty="0"/>
+              <a:t> </a:t>
+            </a:r>
+            <a:r>
+              <a:rPr lang="en-GB" dirty="0" err="1"/>
+              <a:t>ser</a:t>
+            </a:r>
+            <a:r>
+              <a:rPr lang="en-GB" dirty="0"/>
+              <a:t> </a:t>
+            </a:r>
+            <a:r>
+              <a:rPr lang="en-GB" dirty="0" err="1"/>
+              <a:t>melhorado</a:t>
+            </a:r>
+          </a:p>
+          <a:p>
+            <a:pPr lvl="1"/>
+            <a:r>
+              <a:rPr lang="en-GB" dirty="0" err="1"/>
+              <a:t>Problema</a:t>
+            </a:r>
+            <a:r>
+              <a:rPr lang="en-GB" dirty="0"/>
+              <a:t> </a:t>
+            </a:r>
+            <a:r>
+              <a:rPr lang="en-GB" dirty="0" err="1"/>
+              <a:t>supervisionado</a:t>
+            </a:r>
+            <a:r>
+              <a:rPr lang="en-GB" dirty="0"/>
+              <a:t> </a:t>
+            </a:r>
+            <a:r>
+              <a:rPr lang="en-GB" dirty="0" err="1"/>
+              <a:t>p.e.</a:t>
+            </a:r>
+          </a:p>
+        </p:txBody>
+      </p:sp>
+    </p:spTree>
+    <p:extLst>
+      <p:ext uri="{BB962C8B-B14F-4D97-AF65-F5344CB8AC3E}">
+        <p14:creationId xmlns:p14="http://schemas.microsoft.com/office/powerpoint/2010/main" val="1617978226"/>
+      </p:ext>
+    </p:extLst>
+  </p:cSld>
+  <p:clrMapOvr>
+    <a:masterClrMapping/>
+  </p:clrMapOvr>
+</p:sld>
+</file>
+
+<file path=ppt/slides/slide26.xml><?xml version="1.0" encoding="utf-8"?>
+<p:sld xmlns:a="http://schemas.openxmlformats.org/drawingml/2006/main" xmlns:r="http://schemas.openxmlformats.org/officeDocument/2006/relationships" xmlns:p="http://schemas.openxmlformats.org/presentationml/2006/main">
+  <p:cSld>
+    <p:spTree>
+      <p:nvGrpSpPr>
+        <p:cNvPr id="1" name=""/>
+        <p:cNvGrpSpPr/>
+        <p:nvPr/>
+      </p:nvGrpSpPr>
+      <p:grpSpPr>
+        <a:xfrm>
+          <a:off x="0" y="0"/>
+          <a:ext cx="0" cy="0"/>
+          <a:chOff x="0" y="0"/>
+          <a:chExt cx="0" cy="0"/>
+        </a:xfrm>
+      </p:grpSpPr>
+      <p:sp>
+        <p:nvSpPr>
+          <p:cNvPr id="2" name="Title 1">
+            <a:extLst>
+              <a:ext uri="{FF2B5EF4-FFF2-40B4-BE49-F238E27FC236}">
+                <a16:creationId xmlns:a16="http://schemas.microsoft.com/office/drawing/2014/main" id="{6907B65E-4954-4012-A1E5-B10808A08813}"/>
+              </a:ext>
+            </a:extLst>
+          </p:cNvPr>
+          <p:cNvSpPr>
+            <a:spLocks noGrp="1"/>
+          </p:cNvSpPr>
+          <p:nvPr>
+            <p:ph type="title"/>
+          </p:nvPr>
+        </p:nvSpPr>
+        <p:spPr/>
+        <p:txBody>
+          <a:bodyPr/>
+          <a:lstStyle/>
+          <a:p>
+            <a:r>
+              <a:rPr lang="en-GB" dirty="0" err="1"/>
+              <a:t>Bibliografia</a:t>
+            </a:r>
+            <a:endParaRPr lang="en-US" dirty="0" err="1">
+              <a:solidFill>
+                <a:schemeClr val="tx1"/>
+              </a:solidFill>
+            </a:endParaRPr>
+          </a:p>
+        </p:txBody>
+      </p:sp>
+      <p:sp>
+        <p:nvSpPr>
+          <p:cNvPr id="3" name="Content Placeholder 2">
+            <a:extLst>
+              <a:ext uri="{FF2B5EF4-FFF2-40B4-BE49-F238E27FC236}">
+                <a16:creationId xmlns:a16="http://schemas.microsoft.com/office/drawing/2014/main" id="{43F45694-8DE4-4DE6-9BAA-7BB2AB818D1D}"/>
+              </a:ext>
+            </a:extLst>
+          </p:cNvPr>
+          <p:cNvSpPr>
+            <a:spLocks noGrp="1"/>
+          </p:cNvSpPr>
+          <p:nvPr>
+            <p:ph idx="1"/>
+          </p:nvPr>
+        </p:nvSpPr>
+        <p:spPr/>
+        <p:txBody>
+          <a:bodyPr/>
+          <a:lstStyle/>
+          <a:p>
+            <a:r>
+              <a:rPr lang="en-GB" dirty="0" err="1"/>
+              <a:t>Brajdic</a:t>
+            </a:r>
+            <a:r>
+              <a:rPr lang="en-GB" dirty="0"/>
+              <a:t>, Agata, and Robert Harle. "Walk detection and step counting on unconstrained smartphones." Proceedings of the 2013 ACM international joint conference on Pervasive and ubiquitous computing. ACM, 2013.</a:t>
+            </a:r>
+          </a:p>
+          <a:p>
+            <a:r>
+              <a:rPr lang="en-GB" dirty="0"/>
+              <a:t>Nickel, Claudia, Tobias </a:t>
+            </a:r>
+            <a:r>
+              <a:rPr lang="en-GB" dirty="0" err="1"/>
+              <a:t>Wirtl</a:t>
+            </a:r>
+            <a:r>
+              <a:rPr lang="en-GB" dirty="0"/>
+              <a:t>, and Christoph Busch. "Authentication of smartphone users based on the way they walk using k-</a:t>
+            </a:r>
+            <a:r>
+              <a:rPr lang="en-GB" dirty="0" err="1"/>
+              <a:t>nn</a:t>
+            </a:r>
+            <a:r>
+              <a:rPr lang="en-GB" dirty="0"/>
+              <a:t> algorithm." Intelligent Information Hiding and Multimedia Signal Processing (IIH-MSP), 2012 Eighth International Conference on. IEEE, 2012.</a:t>
+            </a:r>
+          </a:p>
+          <a:p>
+            <a:r>
+              <a:rPr lang="en-GB" dirty="0" err="1"/>
+              <a:t>Derawi</a:t>
+            </a:r>
+            <a:r>
+              <a:rPr lang="en-GB" dirty="0"/>
+              <a:t>, Mohammad Omar, et al. "Unobtrusive user-authentication on mobile phones using biometric gait recognition." Intelligent Information Hiding and Multimedia Signal Processing (IIH-MSP), 2010 Sixth International Conference on. IEEE, 2010.</a:t>
+            </a:r>
+          </a:p>
+        </p:txBody>
+      </p:sp>
+    </p:spTree>
+    <p:extLst>
+      <p:ext uri="{BB962C8B-B14F-4D97-AF65-F5344CB8AC3E}">
+        <p14:creationId xmlns:p14="http://schemas.microsoft.com/office/powerpoint/2010/main" val="3379323335"/>
+      </p:ext>
+    </p:extLst>
+  </p:cSld>
+  <p:clrMapOvr>
+    <a:masterClrMapping/>
+  </p:clrMapOvr>
+</p:sld>
+</file>
+
+<file path=ppt/slides/slide27.xml><?xml version="1.0" encoding="utf-8"?>
+<p:sld xmlns:a="http://schemas.openxmlformats.org/drawingml/2006/main" xmlns:r="http://schemas.openxmlformats.org/officeDocument/2006/relationships" xmlns:p="http://schemas.openxmlformats.org/presentationml/2006/main">
+  <p:cSld>
+    <p:spTree>
+      <p:nvGrpSpPr>
+        <p:cNvPr id="1" name=""/>
+        <p:cNvGrpSpPr/>
+        <p:nvPr/>
+      </p:nvGrpSpPr>
+      <p:grpSpPr>
+        <a:xfrm>
+          <a:off x="0" y="0"/>
+          <a:ext cx="0" cy="0"/>
+          <a:chOff x="0" y="0"/>
+          <a:chExt cx="0" cy="0"/>
+        </a:xfrm>
+      </p:grpSpPr>
+      <p:sp>
+        <p:nvSpPr>
+          <p:cNvPr id="3" name="TextBox 2">
+            <a:extLst>
+              <a:ext uri="{FF2B5EF4-FFF2-40B4-BE49-F238E27FC236}">
+                <a16:creationId xmlns:a16="http://schemas.microsoft.com/office/drawing/2014/main" id="{6559F07F-5EDB-4AF1-8039-F8DE1B8505B7}"/>
+              </a:ext>
+            </a:extLst>
+          </p:cNvPr>
+          <p:cNvSpPr txBox="1"/>
+          <p:nvPr/>
+        </p:nvSpPr>
+        <p:spPr>
+          <a:xfrm>
+            <a:off x="23005" y="3063815"/>
+            <a:ext cx="12160368" cy="646331"/>
+          </a:xfrm>
+          <a:prstGeom prst="rect">
+            <a:avLst/>
+          </a:prstGeom>
+        </p:spPr>
+        <p:txBody>
+          <a:bodyPr rot="0" spcFirstLastPara="0" vertOverflow="overflow" horzOverflow="overflow" vert="horz" wrap="square" lIns="91440" tIns="45720" rIns="91440" bIns="45720" numCol="1" spcCol="0" rtlCol="0" fromWordArt="0" anchor="t" anchorCtr="0" forceAA="0" compatLnSpc="1">
+            <a:prstTxWarp prst="textNoShape">
+              <a:avLst/>
+            </a:prstTxWarp>
+            <a:spAutoFit/>
+          </a:bodyPr>
+          <a:lstStyle/>
+          <a:p>
+            <a:pPr algn="ctr"/>
+            <a:r>
+              <a:rPr lang="en-GB" sz="3600" dirty="0" err="1"/>
+              <a:t>Obrigado</a:t>
+            </a:r>
+            <a:r>
+              <a:rPr lang="en-GB" sz="3600" dirty="0"/>
+              <a:t> Pela </a:t>
+            </a:r>
+            <a:r>
+              <a:rPr lang="en-GB" sz="3600" dirty="0" err="1"/>
+              <a:t>Atenção</a:t>
+            </a:r>
+            <a:r>
+              <a:rPr lang="en-GB" sz="3600" dirty="0"/>
+              <a:t>!</a:t>
+            </a:r>
+          </a:p>
+        </p:txBody>
+      </p:sp>
+    </p:spTree>
+    <p:extLst>
+      <p:ext uri="{BB962C8B-B14F-4D97-AF65-F5344CB8AC3E}">
+        <p14:creationId xmlns:p14="http://schemas.microsoft.com/office/powerpoint/2010/main" val="2864752620"/>
       </p:ext>
     </p:extLst>
   </p:cSld>

</xml_diff>